<commit_message>
final report, lab presentatino, rheostat collabs
</commit_message>
<xml_diff>
--- a/miscellaneous/presentations/20200825_labmtg.pptx
+++ b/miscellaneous/presentations/20200825_labmtg.pptx
@@ -2130,7 +2130,7 @@
   <dgm:whole/>
   <dgm:extLst>
     <a:ext uri="http://schemas.microsoft.com/office/drawing/2008/diagram">
-      <dsp:dataModelExt xmlns:dsp="http://schemas.microsoft.com/office/drawing/2008/diagram" relId="rId6" minVer="http://schemas.openxmlformats.org/drawingml/2006/diagram"/>
+      <dsp:dataModelExt xmlns:dsp="http://schemas.microsoft.com/office/drawing/2008/diagram" relId="rId7" minVer="http://schemas.openxmlformats.org/drawingml/2006/diagram"/>
     </a:ext>
   </dgm:extLst>
 </dgm:dataModel>
@@ -2512,7 +2512,7 @@
   <dgm:whole/>
   <dgm:extLst>
     <a:ext uri="http://schemas.microsoft.com/office/drawing/2008/diagram">
-      <dsp:dataModelExt xmlns:dsp="http://schemas.microsoft.com/office/drawing/2008/diagram" relId="rId6" minVer="http://schemas.openxmlformats.org/drawingml/2006/diagram"/>
+      <dsp:dataModelExt xmlns:dsp="http://schemas.microsoft.com/office/drawing/2008/diagram" relId="rId7" minVer="http://schemas.openxmlformats.org/drawingml/2006/diagram"/>
     </a:ext>
   </dgm:extLst>
 </dgm:dataModel>
@@ -6797,14 +6797,7 @@
           <a:bodyPr/>
           <a:lstStyle/>
           <a:p>
-            <a:r>
-              <a:rPr lang="en-US" dirty="0">
-                <a:solidFill>
-                  <a:srgbClr val="FF0000"/>
-                </a:solidFill>
-              </a:rPr>
-              <a:t>Recheck plots</a:t>
-            </a:r>
+            <a:endParaRPr lang="en-US" dirty="0"/>
           </a:p>
         </p:txBody>
       </p:sp>
@@ -6825,6 +6818,265 @@
           <a:p>
             <a:fld id="{E664AA93-6F0D-5A4C-B7F1-05D840C85487}" type="slidenum">
               <a:rPr lang="en-US" smtClean="0"/>
+              <a:t>5</a:t>
+            </a:fld>
+            <a:endParaRPr lang="en-US"/>
+          </a:p>
+        </p:txBody>
+      </p:sp>
+    </p:spTree>
+    <p:extLst>
+      <p:ext uri="{BB962C8B-B14F-4D97-AF65-F5344CB8AC3E}">
+        <p14:creationId xmlns:p14="http://schemas.microsoft.com/office/powerpoint/2010/main" val="4044222828"/>
+      </p:ext>
+    </p:extLst>
+  </p:cSld>
+  <p:clrMapOvr>
+    <a:masterClrMapping/>
+  </p:clrMapOvr>
+</p:notes>
+</file>
+
+<file path=ppt/notesSlides/notesSlide2.xml><?xml version="1.0" encoding="utf-8"?>
+<p:notes xmlns:a="http://schemas.openxmlformats.org/drawingml/2006/main" xmlns:r="http://schemas.openxmlformats.org/officeDocument/2006/relationships" xmlns:p="http://schemas.openxmlformats.org/presentationml/2006/main">
+  <p:cSld>
+    <p:spTree>
+      <p:nvGrpSpPr>
+        <p:cNvPr id="1" name=""/>
+        <p:cNvGrpSpPr/>
+        <p:nvPr/>
+      </p:nvGrpSpPr>
+      <p:grpSpPr>
+        <a:xfrm>
+          <a:off x="0" y="0"/>
+          <a:ext cx="0" cy="0"/>
+          <a:chOff x="0" y="0"/>
+          <a:chExt cx="0" cy="0"/>
+        </a:xfrm>
+      </p:grpSpPr>
+      <p:sp>
+        <p:nvSpPr>
+          <p:cNvPr id="2" name="Slide Image Placeholder 1"/>
+          <p:cNvSpPr>
+            <a:spLocks noGrp="1" noRot="1" noChangeAspect="1"/>
+          </p:cNvSpPr>
+          <p:nvPr>
+            <p:ph type="sldImg"/>
+          </p:nvPr>
+        </p:nvSpPr>
+        <p:spPr/>
+      </p:sp>
+      <p:sp>
+        <p:nvSpPr>
+          <p:cNvPr id="3" name="Notes Placeholder 2"/>
+          <p:cNvSpPr>
+            <a:spLocks noGrp="1"/>
+          </p:cNvSpPr>
+          <p:nvPr>
+            <p:ph type="body" idx="1"/>
+          </p:nvPr>
+        </p:nvSpPr>
+        <p:spPr/>
+        <p:txBody>
+          <a:bodyPr/>
+          <a:lstStyle/>
+          <a:p>
+            <a:endParaRPr lang="en-US" dirty="0"/>
+          </a:p>
+        </p:txBody>
+      </p:sp>
+      <p:sp>
+        <p:nvSpPr>
+          <p:cNvPr id="4" name="Slide Number Placeholder 3"/>
+          <p:cNvSpPr>
+            <a:spLocks noGrp="1"/>
+          </p:cNvSpPr>
+          <p:nvPr>
+            <p:ph type="sldNum" sz="quarter" idx="5"/>
+          </p:nvPr>
+        </p:nvSpPr>
+        <p:spPr/>
+        <p:txBody>
+          <a:bodyPr/>
+          <a:lstStyle/>
+          <a:p>
+            <a:fld id="{E664AA93-6F0D-5A4C-B7F1-05D840C85487}" type="slidenum">
+              <a:rPr lang="en-US" smtClean="0"/>
+              <a:t>8</a:t>
+            </a:fld>
+            <a:endParaRPr lang="en-US"/>
+          </a:p>
+        </p:txBody>
+      </p:sp>
+    </p:spTree>
+    <p:extLst>
+      <p:ext uri="{BB962C8B-B14F-4D97-AF65-F5344CB8AC3E}">
+        <p14:creationId xmlns:p14="http://schemas.microsoft.com/office/powerpoint/2010/main" val="2616987978"/>
+      </p:ext>
+    </p:extLst>
+  </p:cSld>
+  <p:clrMapOvr>
+    <a:masterClrMapping/>
+  </p:clrMapOvr>
+</p:notes>
+</file>
+
+<file path=ppt/notesSlides/notesSlide3.xml><?xml version="1.0" encoding="utf-8"?>
+<p:notes xmlns:a="http://schemas.openxmlformats.org/drawingml/2006/main" xmlns:r="http://schemas.openxmlformats.org/officeDocument/2006/relationships" xmlns:p="http://schemas.openxmlformats.org/presentationml/2006/main">
+  <p:cSld>
+    <p:spTree>
+      <p:nvGrpSpPr>
+        <p:cNvPr id="1" name=""/>
+        <p:cNvGrpSpPr/>
+        <p:nvPr/>
+      </p:nvGrpSpPr>
+      <p:grpSpPr>
+        <a:xfrm>
+          <a:off x="0" y="0"/>
+          <a:ext cx="0" cy="0"/>
+          <a:chOff x="0" y="0"/>
+          <a:chExt cx="0" cy="0"/>
+        </a:xfrm>
+      </p:grpSpPr>
+      <p:sp>
+        <p:nvSpPr>
+          <p:cNvPr id="2" name="Slide Image Placeholder 1"/>
+          <p:cNvSpPr>
+            <a:spLocks noGrp="1" noRot="1" noChangeAspect="1"/>
+          </p:cNvSpPr>
+          <p:nvPr>
+            <p:ph type="sldImg"/>
+          </p:nvPr>
+        </p:nvSpPr>
+        <p:spPr/>
+      </p:sp>
+      <p:sp>
+        <p:nvSpPr>
+          <p:cNvPr id="3" name="Notes Placeholder 2"/>
+          <p:cNvSpPr>
+            <a:spLocks noGrp="1"/>
+          </p:cNvSpPr>
+          <p:nvPr>
+            <p:ph type="body" idx="1"/>
+          </p:nvPr>
+        </p:nvSpPr>
+        <p:spPr/>
+        <p:txBody>
+          <a:bodyPr/>
+          <a:lstStyle/>
+          <a:p>
+            <a:endParaRPr lang="en-US" dirty="0"/>
+          </a:p>
+        </p:txBody>
+      </p:sp>
+      <p:sp>
+        <p:nvSpPr>
+          <p:cNvPr id="4" name="Slide Number Placeholder 3"/>
+          <p:cNvSpPr>
+            <a:spLocks noGrp="1"/>
+          </p:cNvSpPr>
+          <p:nvPr>
+            <p:ph type="sldNum" sz="quarter" idx="5"/>
+          </p:nvPr>
+        </p:nvSpPr>
+        <p:spPr/>
+        <p:txBody>
+          <a:bodyPr/>
+          <a:lstStyle/>
+          <a:p>
+            <a:fld id="{E664AA93-6F0D-5A4C-B7F1-05D840C85487}" type="slidenum">
+              <a:rPr lang="en-US" smtClean="0"/>
+              <a:t>9</a:t>
+            </a:fld>
+            <a:endParaRPr lang="en-US"/>
+          </a:p>
+        </p:txBody>
+      </p:sp>
+    </p:spTree>
+    <p:extLst>
+      <p:ext uri="{BB962C8B-B14F-4D97-AF65-F5344CB8AC3E}">
+        <p14:creationId xmlns:p14="http://schemas.microsoft.com/office/powerpoint/2010/main" val="3301886910"/>
+      </p:ext>
+    </p:extLst>
+  </p:cSld>
+  <p:clrMapOvr>
+    <a:masterClrMapping/>
+  </p:clrMapOvr>
+</p:notes>
+</file>
+
+<file path=ppt/notesSlides/notesSlide4.xml><?xml version="1.0" encoding="utf-8"?>
+<p:notes xmlns:a="http://schemas.openxmlformats.org/drawingml/2006/main" xmlns:r="http://schemas.openxmlformats.org/officeDocument/2006/relationships" xmlns:p="http://schemas.openxmlformats.org/presentationml/2006/main">
+  <p:cSld>
+    <p:spTree>
+      <p:nvGrpSpPr>
+        <p:cNvPr id="1" name=""/>
+        <p:cNvGrpSpPr/>
+        <p:nvPr/>
+      </p:nvGrpSpPr>
+      <p:grpSpPr>
+        <a:xfrm>
+          <a:off x="0" y="0"/>
+          <a:ext cx="0" cy="0"/>
+          <a:chOff x="0" y="0"/>
+          <a:chExt cx="0" cy="0"/>
+        </a:xfrm>
+      </p:grpSpPr>
+      <p:sp>
+        <p:nvSpPr>
+          <p:cNvPr id="2" name="Slide Image Placeholder 1"/>
+          <p:cNvSpPr>
+            <a:spLocks noGrp="1" noRot="1" noChangeAspect="1"/>
+          </p:cNvSpPr>
+          <p:nvPr>
+            <p:ph type="sldImg"/>
+          </p:nvPr>
+        </p:nvSpPr>
+        <p:spPr/>
+      </p:sp>
+      <p:sp>
+        <p:nvSpPr>
+          <p:cNvPr id="3" name="Notes Placeholder 2"/>
+          <p:cNvSpPr>
+            <a:spLocks noGrp="1"/>
+          </p:cNvSpPr>
+          <p:nvPr>
+            <p:ph type="body" idx="1"/>
+          </p:nvPr>
+        </p:nvSpPr>
+        <p:spPr/>
+        <p:txBody>
+          <a:bodyPr/>
+          <a:lstStyle/>
+          <a:p>
+            <a:r>
+              <a:rPr lang="en-US" dirty="0">
+                <a:solidFill>
+                  <a:srgbClr val="FF0000"/>
+                </a:solidFill>
+              </a:rPr>
+              <a:t>Recheck plots</a:t>
+            </a:r>
+          </a:p>
+        </p:txBody>
+      </p:sp>
+      <p:sp>
+        <p:nvSpPr>
+          <p:cNvPr id="4" name="Slide Number Placeholder 3"/>
+          <p:cNvSpPr>
+            <a:spLocks noGrp="1"/>
+          </p:cNvSpPr>
+          <p:nvPr>
+            <p:ph type="sldNum" sz="quarter" idx="5"/>
+          </p:nvPr>
+        </p:nvSpPr>
+        <p:spPr/>
+        <p:txBody>
+          <a:bodyPr/>
+          <a:lstStyle/>
+          <a:p>
+            <a:fld id="{E664AA93-6F0D-5A4C-B7F1-05D840C85487}" type="slidenum">
+              <a:rPr lang="en-US" smtClean="0"/>
               <a:t>10</a:t>
             </a:fld>
             <a:endParaRPr lang="en-US"/>
@@ -6844,7 +7096,91 @@
 </p:notes>
 </file>
 
-<file path=ppt/notesSlides/notesSlide2.xml><?xml version="1.0" encoding="utf-8"?>
+<file path=ppt/notesSlides/notesSlide5.xml><?xml version="1.0" encoding="utf-8"?>
+<p:notes xmlns:a="http://schemas.openxmlformats.org/drawingml/2006/main" xmlns:r="http://schemas.openxmlformats.org/officeDocument/2006/relationships" xmlns:p="http://schemas.openxmlformats.org/presentationml/2006/main">
+  <p:cSld>
+    <p:spTree>
+      <p:nvGrpSpPr>
+        <p:cNvPr id="1" name=""/>
+        <p:cNvGrpSpPr/>
+        <p:nvPr/>
+      </p:nvGrpSpPr>
+      <p:grpSpPr>
+        <a:xfrm>
+          <a:off x="0" y="0"/>
+          <a:ext cx="0" cy="0"/>
+          <a:chOff x="0" y="0"/>
+          <a:chExt cx="0" cy="0"/>
+        </a:xfrm>
+      </p:grpSpPr>
+      <p:sp>
+        <p:nvSpPr>
+          <p:cNvPr id="2" name="Slide Image Placeholder 1"/>
+          <p:cNvSpPr>
+            <a:spLocks noGrp="1" noRot="1" noChangeAspect="1"/>
+          </p:cNvSpPr>
+          <p:nvPr>
+            <p:ph type="sldImg"/>
+          </p:nvPr>
+        </p:nvSpPr>
+        <p:spPr/>
+      </p:sp>
+      <p:sp>
+        <p:nvSpPr>
+          <p:cNvPr id="3" name="Notes Placeholder 2"/>
+          <p:cNvSpPr>
+            <a:spLocks noGrp="1"/>
+          </p:cNvSpPr>
+          <p:nvPr>
+            <p:ph type="body" idx="1"/>
+          </p:nvPr>
+        </p:nvSpPr>
+        <p:spPr/>
+        <p:txBody>
+          <a:bodyPr/>
+          <a:lstStyle/>
+          <a:p>
+            <a:endParaRPr lang="en-US" dirty="0"/>
+          </a:p>
+        </p:txBody>
+      </p:sp>
+      <p:sp>
+        <p:nvSpPr>
+          <p:cNvPr id="4" name="Slide Number Placeholder 3"/>
+          <p:cNvSpPr>
+            <a:spLocks noGrp="1"/>
+          </p:cNvSpPr>
+          <p:nvPr>
+            <p:ph type="sldNum" sz="quarter" idx="5"/>
+          </p:nvPr>
+        </p:nvSpPr>
+        <p:spPr/>
+        <p:txBody>
+          <a:bodyPr/>
+          <a:lstStyle/>
+          <a:p>
+            <a:fld id="{E664AA93-6F0D-5A4C-B7F1-05D840C85487}" type="slidenum">
+              <a:rPr lang="en-US" smtClean="0"/>
+              <a:t>12</a:t>
+            </a:fld>
+            <a:endParaRPr lang="en-US"/>
+          </a:p>
+        </p:txBody>
+      </p:sp>
+    </p:spTree>
+    <p:extLst>
+      <p:ext uri="{BB962C8B-B14F-4D97-AF65-F5344CB8AC3E}">
+        <p14:creationId xmlns:p14="http://schemas.microsoft.com/office/powerpoint/2010/main" val="3922440726"/>
+      </p:ext>
+    </p:extLst>
+  </p:cSld>
+  <p:clrMapOvr>
+    <a:masterClrMapping/>
+  </p:clrMapOvr>
+</p:notes>
+</file>
+
+<file path=ppt/notesSlides/notesSlide6.xml><?xml version="1.0" encoding="utf-8"?>
 <p:notes xmlns:a="http://schemas.openxmlformats.org/drawingml/2006/main" xmlns:r="http://schemas.openxmlformats.org/officeDocument/2006/relationships" xmlns:p="http://schemas.openxmlformats.org/presentationml/2006/main">
   <p:cSld>
     <p:spTree>
@@ -10654,10 +10990,10 @@
       </p:sp>
       <p:pic>
         <p:nvPicPr>
-          <p:cNvPr id="6" name="Picture 5" descr="A screenshot of a cell phone&#10;&#10;Description automatically generated">
+          <p:cNvPr id="9" name="Picture 8" descr="A close up of a map&#10;&#10;Description automatically generated">
             <a:extLst>
               <a:ext uri="{FF2B5EF4-FFF2-40B4-BE49-F238E27FC236}">
-                <a16:creationId xmlns:a16="http://schemas.microsoft.com/office/drawing/2014/main" id="{8C792E52-C05C-C146-8719-0D33CBA76423}"/>
+                <a16:creationId xmlns:a16="http://schemas.microsoft.com/office/drawing/2014/main" id="{22F67FA9-C117-DC44-8775-37020064D2F5}"/>
               </a:ext>
             </a:extLst>
           </p:cNvPr>
@@ -10674,8 +11010,8 @@
         </p:blipFill>
         <p:spPr>
           <a:xfrm>
-            <a:off x="1068265" y="1600200"/>
-            <a:ext cx="4702629" cy="3657600"/>
+            <a:off x="6201653" y="1452774"/>
+            <a:ext cx="5290457" cy="4114800"/>
           </a:xfrm>
           <a:prstGeom prst="rect">
             <a:avLst/>
@@ -10684,10 +11020,10 @@
       </p:pic>
       <p:pic>
         <p:nvPicPr>
-          <p:cNvPr id="7" name="Picture 6" descr="A close up of a map&#10;&#10;Description automatically generated">
+          <p:cNvPr id="11" name="Picture 10" descr="A screenshot of a cell phone&#10;&#10;Description automatically generated">
             <a:extLst>
               <a:ext uri="{FF2B5EF4-FFF2-40B4-BE49-F238E27FC236}">
-                <a16:creationId xmlns:a16="http://schemas.microsoft.com/office/drawing/2014/main" id="{0CE96582-058C-4348-9582-E4CC678216B7}"/>
+                <a16:creationId xmlns:a16="http://schemas.microsoft.com/office/drawing/2014/main" id="{F75DB027-FE91-0D4C-9705-9D0F9D2C7812}"/>
               </a:ext>
             </a:extLst>
           </p:cNvPr>
@@ -10704,8 +11040,8 @@
         </p:blipFill>
         <p:spPr>
           <a:xfrm>
-            <a:off x="6212296" y="1600200"/>
-            <a:ext cx="4702629" cy="3657600"/>
+            <a:off x="699892" y="1452774"/>
+            <a:ext cx="5290457" cy="4114800"/>
           </a:xfrm>
           <a:prstGeom prst="rect">
             <a:avLst/>
@@ -11925,7 +12261,7 @@
             <p:nvPr/>
           </p:nvPicPr>
           <p:blipFill>
-            <a:blip r:embed="rId2"/>
+            <a:blip r:embed="rId3"/>
             <a:stretch>
               <a:fillRect/>
             </a:stretch>
@@ -11955,7 +12291,7 @@
             <p:nvPr/>
           </p:nvPicPr>
           <p:blipFill rotWithShape="1">
-            <a:blip r:embed="rId3"/>
+            <a:blip r:embed="rId4"/>
             <a:srcRect l="48213" r="6998" b="4488"/>
             <a:stretch/>
           </p:blipFill>
@@ -11984,7 +12320,7 @@
             <p:nvPr/>
           </p:nvPicPr>
           <p:blipFill>
-            <a:blip r:embed="rId4"/>
+            <a:blip r:embed="rId5"/>
             <a:stretch>
               <a:fillRect/>
             </a:stretch>
@@ -12014,10 +12350,10 @@
         </p:nvGrpSpPr>
         <p:grpSpPr>
           <a:xfrm>
-            <a:off x="442379" y="5608204"/>
-            <a:ext cx="7033487" cy="837116"/>
-            <a:chOff x="34800014" y="20189177"/>
-            <a:chExt cx="8812265" cy="1296444"/>
+            <a:off x="442379" y="5597002"/>
+            <a:ext cx="7033487" cy="848319"/>
+            <a:chOff x="34800014" y="20171827"/>
+            <a:chExt cx="8812265" cy="1313794"/>
           </a:xfrm>
         </p:grpSpPr>
         <p:sp>
@@ -12287,8 +12623,8 @@
           </p:nvSpPr>
           <p:spPr>
             <a:xfrm>
-              <a:off x="35660307" y="20189177"/>
-              <a:ext cx="1481326" cy="714983"/>
+              <a:off x="35827277" y="20171827"/>
+              <a:ext cx="1481327" cy="714983"/>
             </a:xfrm>
             <a:prstGeom prst="rect">
               <a:avLst/>
@@ -12468,7 +12804,7 @@
           <p:nvPr/>
         </p:nvPicPr>
         <p:blipFill>
-          <a:blip r:embed="rId5"/>
+          <a:blip r:embed="rId6"/>
           <a:stretch>
             <a:fillRect/>
           </a:stretch>
@@ -12498,7 +12834,7 @@
           <p:nvPr/>
         </p:nvPicPr>
         <p:blipFill>
-          <a:blip r:embed="rId6"/>
+          <a:blip r:embed="rId7"/>
           <a:stretch>
             <a:fillRect/>
           </a:stretch>
@@ -16485,41 +16821,11 @@
         <p:grpSpPr>
           <a:xfrm>
             <a:off x="4422757" y="1404613"/>
-            <a:ext cx="6577038" cy="4724400"/>
+            <a:ext cx="6577038" cy="4606669"/>
             <a:chOff x="4498957" y="2611113"/>
-            <a:chExt cx="6577038" cy="4724400"/>
+            <a:chExt cx="6577038" cy="4606669"/>
           </a:xfrm>
         </p:grpSpPr>
-        <p:pic>
-          <p:nvPicPr>
-            <p:cNvPr id="7" name="Picture 6" descr="A close up of a map&#10;&#10;Description automatically generated">
-              <a:extLst>
-                <a:ext uri="{FF2B5EF4-FFF2-40B4-BE49-F238E27FC236}">
-                  <a16:creationId xmlns:a16="http://schemas.microsoft.com/office/drawing/2014/main" id="{4081133B-4A72-1C41-8738-B764A22ABD7E}"/>
-                </a:ext>
-              </a:extLst>
-            </p:cNvPr>
-            <p:cNvPicPr>
-              <a:picLocks noChangeAspect="1"/>
-            </p:cNvPicPr>
-            <p:nvPr/>
-          </p:nvPicPr>
-          <p:blipFill>
-            <a:blip r:embed="rId2"/>
-            <a:stretch>
-              <a:fillRect/>
-            </a:stretch>
-          </p:blipFill>
-          <p:spPr>
-            <a:xfrm>
-              <a:off x="4515536" y="5049513"/>
-              <a:ext cx="4114800" cy="2286000"/>
-            </a:xfrm>
-            <a:prstGeom prst="rect">
-              <a:avLst/>
-            </a:prstGeom>
-          </p:spPr>
-        </p:pic>
         <p:pic>
           <p:nvPicPr>
             <p:cNvPr id="8" name="Picture 7" descr="A screenshot of a cell phone&#10;&#10;Description automatically generated">
@@ -16675,6 +16981,72 @@
           <a:xfrm>
             <a:off x="1058873" y="1490541"/>
             <a:ext cx="1912005" cy="4400144"/>
+          </a:xfrm>
+          <a:prstGeom prst="rect">
+            <a:avLst/>
+          </a:prstGeom>
+        </p:spPr>
+      </p:pic>
+      <p:pic>
+        <p:nvPicPr>
+          <p:cNvPr id="13" name="Picture 12" descr="A close up of a piece of paper&#10;&#10;Description automatically generated">
+            <a:extLst>
+              <a:ext uri="{FF2B5EF4-FFF2-40B4-BE49-F238E27FC236}">
+                <a16:creationId xmlns:a16="http://schemas.microsoft.com/office/drawing/2014/main" id="{67ABAB01-899C-034B-A3D6-58EE90E80B63}"/>
+              </a:ext>
+            </a:extLst>
+          </p:cNvPr>
+          <p:cNvPicPr>
+            <a:picLocks noChangeAspect="1"/>
+          </p:cNvPicPr>
+          <p:nvPr/>
+        </p:nvPicPr>
+        <p:blipFill>
+          <a:blip r:embed="rId7">
+            <a:extLst>
+              <a:ext uri="{28A0092B-C50C-407E-A947-70E740481C1C}">
+                <a14:useLocalDpi xmlns:a14="http://schemas.microsoft.com/office/drawing/2010/main" val="0"/>
+              </a:ext>
+            </a:extLst>
+          </a:blip>
+          <a:stretch>
+            <a:fillRect/>
+          </a:stretch>
+        </p:blipFill>
+        <p:spPr>
+          <a:xfrm>
+            <a:off x="4422757" y="3725282"/>
+            <a:ext cx="4114800" cy="2286000"/>
+          </a:xfrm>
+          <a:prstGeom prst="rect">
+            <a:avLst/>
+          </a:prstGeom>
+        </p:spPr>
+      </p:pic>
+      <p:pic>
+        <p:nvPicPr>
+          <p:cNvPr id="15" name="Picture 14">
+            <a:extLst>
+              <a:ext uri="{FF2B5EF4-FFF2-40B4-BE49-F238E27FC236}">
+                <a16:creationId xmlns:a16="http://schemas.microsoft.com/office/drawing/2014/main" id="{D64719D3-D7A0-154C-A90D-52DEAF819D90}"/>
+              </a:ext>
+            </a:extLst>
+          </p:cNvPr>
+          <p:cNvPicPr>
+            <a:picLocks noChangeAspect="1"/>
+          </p:cNvPicPr>
+          <p:nvPr/>
+        </p:nvPicPr>
+        <p:blipFill>
+          <a:blip r:embed="rId8"/>
+          <a:stretch>
+            <a:fillRect/>
+          </a:stretch>
+        </p:blipFill>
+        <p:spPr>
+          <a:xfrm>
+            <a:off x="4367293" y="1868271"/>
+            <a:ext cx="245865" cy="1264447"/>
           </a:xfrm>
           <a:prstGeom prst="rect">
             <a:avLst/>
@@ -17362,948 +17734,969 @@
           </a:p>
         </p:txBody>
       </p:sp>
-      <p:sp>
-        <p:nvSpPr>
-          <p:cNvPr id="6" name="Rounded Rectangle 5">
+      <p:grpSp>
+        <p:nvGrpSpPr>
+          <p:cNvPr id="26" name="Group 25">
             <a:extLst>
               <a:ext uri="{FF2B5EF4-FFF2-40B4-BE49-F238E27FC236}">
-                <a16:creationId xmlns:a16="http://schemas.microsoft.com/office/drawing/2014/main" id="{34EF7CA4-D94C-AE4C-9CE9-366C95A8066D}"/>
+                <a16:creationId xmlns:a16="http://schemas.microsoft.com/office/drawing/2014/main" id="{9442E02A-10E3-C04F-AB79-9C74E275244E}"/>
               </a:ext>
             </a:extLst>
           </p:cNvPr>
-          <p:cNvSpPr/>
+          <p:cNvGrpSpPr/>
           <p:nvPr/>
-        </p:nvSpPr>
-        <p:spPr>
+        </p:nvGrpSpPr>
+        <p:grpSpPr>
           <a:xfrm>
-            <a:off x="425758" y="1332636"/>
-            <a:ext cx="1943100" cy="1073294"/>
+            <a:off x="425758" y="1107757"/>
+            <a:ext cx="11747493" cy="4430918"/>
+            <a:chOff x="425758" y="1107757"/>
+            <a:chExt cx="11747493" cy="4430918"/>
           </a:xfrm>
-          <a:prstGeom prst="roundRect">
-            <a:avLst/>
-          </a:prstGeom>
-          <a:solidFill>
-            <a:schemeClr val="accent4">
-              <a:lumMod val="20000"/>
-              <a:lumOff val="80000"/>
-            </a:schemeClr>
-          </a:solidFill>
-          <a:ln>
+        </p:grpSpPr>
+        <p:sp>
+          <p:nvSpPr>
+            <p:cNvPr id="6" name="Rounded Rectangle 5">
+              <a:extLst>
+                <a:ext uri="{FF2B5EF4-FFF2-40B4-BE49-F238E27FC236}">
+                  <a16:creationId xmlns:a16="http://schemas.microsoft.com/office/drawing/2014/main" id="{34EF7CA4-D94C-AE4C-9CE9-366C95A8066D}"/>
+                </a:ext>
+              </a:extLst>
+            </p:cNvPr>
+            <p:cNvSpPr/>
+            <p:nvPr/>
+          </p:nvSpPr>
+          <p:spPr>
+            <a:xfrm>
+              <a:off x="425758" y="1332636"/>
+              <a:ext cx="1943100" cy="1073294"/>
+            </a:xfrm>
+            <a:prstGeom prst="roundRect">
+              <a:avLst/>
+            </a:prstGeom>
             <a:solidFill>
+              <a:schemeClr val="accent4">
+                <a:lumMod val="20000"/>
+                <a:lumOff val="80000"/>
+              </a:schemeClr>
+            </a:solidFill>
+            <a:ln>
+              <a:solidFill>
+                <a:schemeClr val="tx1"/>
+              </a:solidFill>
+            </a:ln>
+          </p:spPr>
+          <p:style>
+            <a:lnRef idx="2">
+              <a:schemeClr val="accent1">
+                <a:shade val="50000"/>
+              </a:schemeClr>
+            </a:lnRef>
+            <a:fillRef idx="1">
+              <a:schemeClr val="accent1"/>
+            </a:fillRef>
+            <a:effectRef idx="0">
+              <a:schemeClr val="accent1"/>
+            </a:effectRef>
+            <a:fontRef idx="minor">
+              <a:schemeClr val="lt1"/>
+            </a:fontRef>
+          </p:style>
+          <p:txBody>
+            <a:bodyPr rtlCol="0" anchor="ctr"/>
+            <a:lstStyle/>
+            <a:p>
+              <a:pPr algn="ctr"/>
+              <a:r>
+                <a:rPr lang="en-US" dirty="0">
+                  <a:solidFill>
+                    <a:sysClr val="windowText" lastClr="000000"/>
+                  </a:solidFill>
+                  <a:latin typeface="Avenir Book" panose="02000503020000020003" pitchFamily="2" charset="0"/>
+                </a:rPr>
+                <a:t>ATP Synthase Transcription &amp; Translation</a:t>
+              </a:r>
+            </a:p>
+          </p:txBody>
+        </p:sp>
+        <p:sp>
+          <p:nvSpPr>
+            <p:cNvPr id="7" name="Rounded Rectangle 6">
+              <a:extLst>
+                <a:ext uri="{FF2B5EF4-FFF2-40B4-BE49-F238E27FC236}">
+                  <a16:creationId xmlns:a16="http://schemas.microsoft.com/office/drawing/2014/main" id="{FD8BFEA5-7D47-064A-AF0D-3F53033C334A}"/>
+                </a:ext>
+              </a:extLst>
+            </p:cNvPr>
+            <p:cNvSpPr/>
+            <p:nvPr/>
+          </p:nvSpPr>
+          <p:spPr>
+            <a:xfrm>
+              <a:off x="2860694" y="1332636"/>
+              <a:ext cx="1943100" cy="1073294"/>
+            </a:xfrm>
+            <a:prstGeom prst="roundRect">
+              <a:avLst/>
+            </a:prstGeom>
+            <a:solidFill>
+              <a:schemeClr val="accent4">
+                <a:lumMod val="20000"/>
+                <a:lumOff val="80000"/>
+              </a:schemeClr>
+            </a:solidFill>
+            <a:ln>
+              <a:solidFill>
+                <a:schemeClr val="tx1"/>
+              </a:solidFill>
+            </a:ln>
+          </p:spPr>
+          <p:style>
+            <a:lnRef idx="2">
+              <a:schemeClr val="accent1">
+                <a:shade val="50000"/>
+              </a:schemeClr>
+            </a:lnRef>
+            <a:fillRef idx="1">
+              <a:schemeClr val="accent1"/>
+            </a:fillRef>
+            <a:effectRef idx="0">
+              <a:schemeClr val="accent1"/>
+            </a:effectRef>
+            <a:fontRef idx="minor">
+              <a:schemeClr val="lt1"/>
+            </a:fontRef>
+          </p:style>
+          <p:txBody>
+            <a:bodyPr rtlCol="0" anchor="ctr"/>
+            <a:lstStyle/>
+            <a:p>
+              <a:pPr algn="ctr"/>
+              <a:r>
+                <a:rPr lang="en-US" dirty="0">
+                  <a:solidFill>
+                    <a:sysClr val="windowText" lastClr="000000"/>
+                  </a:solidFill>
+                  <a:latin typeface="Avenir Book" panose="02000503020000020003" pitchFamily="2" charset="0"/>
+                </a:rPr>
+                <a:t>ATP Synthase Membrane Integration</a:t>
+              </a:r>
+            </a:p>
+          </p:txBody>
+        </p:sp>
+        <p:sp>
+          <p:nvSpPr>
+            <p:cNvPr id="8" name="Rounded Rectangle 7">
+              <a:extLst>
+                <a:ext uri="{FF2B5EF4-FFF2-40B4-BE49-F238E27FC236}">
+                  <a16:creationId xmlns:a16="http://schemas.microsoft.com/office/drawing/2014/main" id="{A4CC21EC-B9B0-644D-8B22-F83F2712BEEF}"/>
+                </a:ext>
+              </a:extLst>
+            </p:cNvPr>
+            <p:cNvSpPr/>
+            <p:nvPr/>
+          </p:nvSpPr>
+          <p:spPr>
+            <a:xfrm>
+              <a:off x="5295630" y="1332636"/>
+              <a:ext cx="1943100" cy="1073294"/>
+            </a:xfrm>
+            <a:prstGeom prst="roundRect">
+              <a:avLst/>
+            </a:prstGeom>
+            <a:solidFill>
+              <a:schemeClr val="accent4">
+                <a:lumMod val="20000"/>
+                <a:lumOff val="80000"/>
+              </a:schemeClr>
+            </a:solidFill>
+            <a:ln>
+              <a:solidFill>
+                <a:schemeClr val="tx1"/>
+              </a:solidFill>
+            </a:ln>
+          </p:spPr>
+          <p:style>
+            <a:lnRef idx="2">
+              <a:schemeClr val="accent1">
+                <a:shade val="50000"/>
+              </a:schemeClr>
+            </a:lnRef>
+            <a:fillRef idx="1">
+              <a:schemeClr val="accent1"/>
+            </a:fillRef>
+            <a:effectRef idx="0">
+              <a:schemeClr val="accent1"/>
+            </a:effectRef>
+            <a:fontRef idx="minor">
+              <a:schemeClr val="lt1"/>
+            </a:fontRef>
+          </p:style>
+          <p:txBody>
+            <a:bodyPr rtlCol="0" anchor="ctr"/>
+            <a:lstStyle/>
+            <a:p>
+              <a:pPr algn="ctr"/>
+              <a:r>
+                <a:rPr lang="en-US" dirty="0">
+                  <a:solidFill>
+                    <a:sysClr val="windowText" lastClr="000000"/>
+                  </a:solidFill>
+                  <a:latin typeface="Avenir Book" panose="02000503020000020003" pitchFamily="2" charset="0"/>
+                </a:rPr>
+                <a:t>ATP Synthesis through ATP Synthase</a:t>
+              </a:r>
+            </a:p>
+          </p:txBody>
+        </p:sp>
+        <p:sp>
+          <p:nvSpPr>
+            <p:cNvPr id="9" name="Rounded Rectangle 8">
+              <a:extLst>
+                <a:ext uri="{FF2B5EF4-FFF2-40B4-BE49-F238E27FC236}">
+                  <a16:creationId xmlns:a16="http://schemas.microsoft.com/office/drawing/2014/main" id="{E5DD0724-8EDB-354A-8005-685F9AA9C287}"/>
+                </a:ext>
+              </a:extLst>
+            </p:cNvPr>
+            <p:cNvSpPr/>
+            <p:nvPr/>
+          </p:nvSpPr>
+          <p:spPr>
+            <a:xfrm>
+              <a:off x="425758" y="2773781"/>
+              <a:ext cx="1943100" cy="1073294"/>
+            </a:xfrm>
+            <a:prstGeom prst="roundRect">
+              <a:avLst/>
+            </a:prstGeom>
+            <a:solidFill>
+              <a:schemeClr val="accent6">
+                <a:lumMod val="20000"/>
+                <a:lumOff val="80000"/>
+              </a:schemeClr>
+            </a:solidFill>
+            <a:ln>
+              <a:solidFill>
+                <a:schemeClr val="tx1"/>
+              </a:solidFill>
+            </a:ln>
+          </p:spPr>
+          <p:style>
+            <a:lnRef idx="2">
+              <a:schemeClr val="accent1">
+                <a:shade val="50000"/>
+              </a:schemeClr>
+            </a:lnRef>
+            <a:fillRef idx="1">
+              <a:schemeClr val="accent1"/>
+            </a:fillRef>
+            <a:effectRef idx="0">
+              <a:schemeClr val="accent1"/>
+            </a:effectRef>
+            <a:fontRef idx="minor">
+              <a:schemeClr val="lt1"/>
+            </a:fontRef>
+          </p:style>
+          <p:txBody>
+            <a:bodyPr rtlCol="0" anchor="ctr"/>
+            <a:lstStyle/>
+            <a:p>
+              <a:pPr algn="ctr"/>
+              <a:r>
+                <a:rPr lang="en-US" dirty="0">
+                  <a:solidFill>
+                    <a:sysClr val="windowText" lastClr="000000"/>
+                  </a:solidFill>
+                  <a:latin typeface="Avenir Book" panose="02000503020000020003" pitchFamily="2" charset="0"/>
+                </a:rPr>
+                <a:t>Proton Pump Transcription &amp; Translation</a:t>
+              </a:r>
+            </a:p>
+          </p:txBody>
+        </p:sp>
+        <p:sp>
+          <p:nvSpPr>
+            <p:cNvPr id="10" name="Rounded Rectangle 9">
+              <a:extLst>
+                <a:ext uri="{FF2B5EF4-FFF2-40B4-BE49-F238E27FC236}">
+                  <a16:creationId xmlns:a16="http://schemas.microsoft.com/office/drawing/2014/main" id="{34AFC73E-F847-3346-A5B1-6C1C6E4D4A12}"/>
+                </a:ext>
+              </a:extLst>
+            </p:cNvPr>
+            <p:cNvSpPr/>
+            <p:nvPr/>
+          </p:nvSpPr>
+          <p:spPr>
+            <a:xfrm>
+              <a:off x="2860694" y="2773781"/>
+              <a:ext cx="1943100" cy="1073294"/>
+            </a:xfrm>
+            <a:prstGeom prst="roundRect">
+              <a:avLst/>
+            </a:prstGeom>
+            <a:solidFill>
+              <a:schemeClr val="accent6">
+                <a:lumMod val="20000"/>
+                <a:lumOff val="80000"/>
+              </a:schemeClr>
+            </a:solidFill>
+            <a:ln>
+              <a:solidFill>
+                <a:schemeClr val="tx1"/>
+              </a:solidFill>
+            </a:ln>
+          </p:spPr>
+          <p:style>
+            <a:lnRef idx="2">
+              <a:schemeClr val="accent1">
+                <a:shade val="50000"/>
+              </a:schemeClr>
+            </a:lnRef>
+            <a:fillRef idx="1">
+              <a:schemeClr val="accent1"/>
+            </a:fillRef>
+            <a:effectRef idx="0">
+              <a:schemeClr val="accent1"/>
+            </a:effectRef>
+            <a:fontRef idx="minor">
+              <a:schemeClr val="lt1"/>
+            </a:fontRef>
+          </p:style>
+          <p:txBody>
+            <a:bodyPr rtlCol="0" anchor="ctr"/>
+            <a:lstStyle/>
+            <a:p>
+              <a:pPr algn="ctr"/>
+              <a:r>
+                <a:rPr lang="en-US" dirty="0">
+                  <a:solidFill>
+                    <a:sysClr val="windowText" lastClr="000000"/>
+                  </a:solidFill>
+                  <a:latin typeface="Avenir Book" panose="02000503020000020003" pitchFamily="2" charset="0"/>
+                </a:rPr>
+                <a:t>Proton Pump Membrane Integration</a:t>
+              </a:r>
+            </a:p>
+          </p:txBody>
+        </p:sp>
+        <p:sp>
+          <p:nvSpPr>
+            <p:cNvPr id="11" name="Rounded Rectangle 10">
+              <a:extLst>
+                <a:ext uri="{FF2B5EF4-FFF2-40B4-BE49-F238E27FC236}">
+                  <a16:creationId xmlns:a16="http://schemas.microsoft.com/office/drawing/2014/main" id="{EF2CAC2B-CB31-EE4D-A539-163299CAE7E0}"/>
+                </a:ext>
+              </a:extLst>
+            </p:cNvPr>
+            <p:cNvSpPr/>
+            <p:nvPr/>
+          </p:nvSpPr>
+          <p:spPr>
+            <a:xfrm>
+              <a:off x="5295630" y="2773781"/>
+              <a:ext cx="1943100" cy="1073294"/>
+            </a:xfrm>
+            <a:prstGeom prst="roundRect">
+              <a:avLst/>
+            </a:prstGeom>
+            <a:solidFill>
+              <a:schemeClr val="accent6">
+                <a:lumMod val="20000"/>
+                <a:lumOff val="80000"/>
+              </a:schemeClr>
+            </a:solidFill>
+            <a:ln>
+              <a:solidFill>
+                <a:schemeClr val="tx1"/>
+              </a:solidFill>
+            </a:ln>
+          </p:spPr>
+          <p:style>
+            <a:lnRef idx="2">
+              <a:schemeClr val="accent1">
+                <a:shade val="50000"/>
+              </a:schemeClr>
+            </a:lnRef>
+            <a:fillRef idx="1">
+              <a:schemeClr val="accent1"/>
+            </a:fillRef>
+            <a:effectRef idx="0">
+              <a:schemeClr val="accent1"/>
+            </a:effectRef>
+            <a:fontRef idx="minor">
+              <a:schemeClr val="lt1"/>
+            </a:fontRef>
+          </p:style>
+          <p:txBody>
+            <a:bodyPr rtlCol="0" anchor="ctr"/>
+            <a:lstStyle/>
+            <a:p>
+              <a:pPr algn="ctr"/>
+              <a:r>
+                <a:rPr lang="en-US" sz="1600" dirty="0">
+                  <a:solidFill>
+                    <a:sysClr val="windowText" lastClr="000000"/>
+                  </a:solidFill>
+                  <a:latin typeface="Avenir Book" panose="02000503020000020003" pitchFamily="2" charset="0"/>
+                </a:rPr>
+                <a:t>Proton movement through Proton Pump</a:t>
+              </a:r>
+            </a:p>
+          </p:txBody>
+        </p:sp>
+        <p:sp>
+          <p:nvSpPr>
+            <p:cNvPr id="12" name="Rounded Rectangle 11">
+              <a:extLst>
+                <a:ext uri="{FF2B5EF4-FFF2-40B4-BE49-F238E27FC236}">
+                  <a16:creationId xmlns:a16="http://schemas.microsoft.com/office/drawing/2014/main" id="{A1BBBE7D-AF24-CA4D-B1FF-A2E565CE28EE}"/>
+                </a:ext>
+              </a:extLst>
+            </p:cNvPr>
+            <p:cNvSpPr/>
+            <p:nvPr/>
+          </p:nvSpPr>
+          <p:spPr>
+            <a:xfrm>
+              <a:off x="425758" y="4218415"/>
+              <a:ext cx="1943100" cy="1073294"/>
+            </a:xfrm>
+            <a:prstGeom prst="roundRect">
+              <a:avLst/>
+            </a:prstGeom>
+            <a:solidFill>
+              <a:schemeClr val="accent2">
+                <a:lumMod val="20000"/>
+                <a:lumOff val="80000"/>
+              </a:schemeClr>
+            </a:solidFill>
+            <a:ln>
+              <a:solidFill>
+                <a:schemeClr val="tx1"/>
+              </a:solidFill>
+            </a:ln>
+          </p:spPr>
+          <p:style>
+            <a:lnRef idx="2">
+              <a:schemeClr val="accent1">
+                <a:shade val="50000"/>
+              </a:schemeClr>
+            </a:lnRef>
+            <a:fillRef idx="1">
+              <a:schemeClr val="accent1"/>
+            </a:fillRef>
+            <a:effectRef idx="0">
+              <a:schemeClr val="accent1"/>
+            </a:effectRef>
+            <a:fontRef idx="minor">
+              <a:schemeClr val="lt1"/>
+            </a:fontRef>
+          </p:style>
+          <p:txBody>
+            <a:bodyPr rtlCol="0" anchor="ctr"/>
+            <a:lstStyle/>
+            <a:p>
+              <a:pPr algn="ctr"/>
+              <a:r>
+                <a:rPr lang="en-US" dirty="0">
+                  <a:solidFill>
+                    <a:sysClr val="windowText" lastClr="000000"/>
+                  </a:solidFill>
+                  <a:latin typeface="Avenir Book" panose="02000503020000020003" pitchFamily="2" charset="0"/>
+                </a:rPr>
+                <a:t>ATP Use</a:t>
+              </a:r>
+            </a:p>
+          </p:txBody>
+        </p:sp>
+        <p:cxnSp>
+          <p:nvCxnSpPr>
+            <p:cNvPr id="13" name="Straight Connector 12">
+              <a:extLst>
+                <a:ext uri="{FF2B5EF4-FFF2-40B4-BE49-F238E27FC236}">
+                  <a16:creationId xmlns:a16="http://schemas.microsoft.com/office/drawing/2014/main" id="{626921E6-F3C4-904F-9836-C09F91FA8208}"/>
+                </a:ext>
+              </a:extLst>
+            </p:cNvPr>
+            <p:cNvCxnSpPr>
+              <a:cxnSpLocks/>
+              <a:stCxn id="6" idx="3"/>
+              <a:endCxn id="7" idx="1"/>
+            </p:cNvCxnSpPr>
+            <p:nvPr/>
+          </p:nvCxnSpPr>
+          <p:spPr>
+            <a:xfrm>
+              <a:off x="2368858" y="1869283"/>
+              <a:ext cx="491836" cy="0"/>
+            </a:xfrm>
+            <a:prstGeom prst="line">
+              <a:avLst/>
+            </a:prstGeom>
+          </p:spPr>
+          <p:style>
+            <a:lnRef idx="1">
+              <a:schemeClr val="dk1"/>
+            </a:lnRef>
+            <a:fillRef idx="0">
+              <a:schemeClr val="dk1"/>
+            </a:fillRef>
+            <a:effectRef idx="0">
+              <a:schemeClr val="dk1"/>
+            </a:effectRef>
+            <a:fontRef idx="minor">
               <a:schemeClr val="tx1"/>
-            </a:solidFill>
-          </a:ln>
-        </p:spPr>
-        <p:style>
-          <a:lnRef idx="2">
-            <a:schemeClr val="accent1">
-              <a:shade val="50000"/>
-            </a:schemeClr>
-          </a:lnRef>
-          <a:fillRef idx="1">
-            <a:schemeClr val="accent1"/>
-          </a:fillRef>
-          <a:effectRef idx="0">
-            <a:schemeClr val="accent1"/>
-          </a:effectRef>
-          <a:fontRef idx="minor">
-            <a:schemeClr val="lt1"/>
-          </a:fontRef>
-        </p:style>
-        <p:txBody>
-          <a:bodyPr rtlCol="0" anchor="ctr"/>
-          <a:lstStyle/>
-          <a:p>
-            <a:pPr algn="ctr"/>
-            <a:r>
-              <a:rPr lang="en-US" dirty="0">
-                <a:solidFill>
-                  <a:sysClr val="windowText" lastClr="000000"/>
-                </a:solidFill>
-                <a:latin typeface="Avenir Book" panose="02000503020000020003" pitchFamily="2" charset="0"/>
-              </a:rPr>
-              <a:t>ATP Synthase Transcription &amp; Translation</a:t>
-            </a:r>
-          </a:p>
-        </p:txBody>
-      </p:sp>
-      <p:sp>
-        <p:nvSpPr>
-          <p:cNvPr id="7" name="Rounded Rectangle 6">
-            <a:extLst>
-              <a:ext uri="{FF2B5EF4-FFF2-40B4-BE49-F238E27FC236}">
-                <a16:creationId xmlns:a16="http://schemas.microsoft.com/office/drawing/2014/main" id="{FD8BFEA5-7D47-064A-AF0D-3F53033C334A}"/>
-              </a:ext>
-            </a:extLst>
-          </p:cNvPr>
-          <p:cNvSpPr/>
-          <p:nvPr/>
-        </p:nvSpPr>
-        <p:spPr>
-          <a:xfrm>
-            <a:off x="2860694" y="1332636"/>
-            <a:ext cx="1943100" cy="1073294"/>
-          </a:xfrm>
-          <a:prstGeom prst="roundRect">
-            <a:avLst/>
-          </a:prstGeom>
-          <a:solidFill>
-            <a:schemeClr val="accent4">
-              <a:lumMod val="20000"/>
-              <a:lumOff val="80000"/>
-            </a:schemeClr>
-          </a:solidFill>
-          <a:ln>
-            <a:solidFill>
+            </a:fontRef>
+          </p:style>
+        </p:cxnSp>
+        <p:cxnSp>
+          <p:nvCxnSpPr>
+            <p:cNvPr id="14" name="Straight Connector 13">
+              <a:extLst>
+                <a:ext uri="{FF2B5EF4-FFF2-40B4-BE49-F238E27FC236}">
+                  <a16:creationId xmlns:a16="http://schemas.microsoft.com/office/drawing/2014/main" id="{E6610521-834B-7B4E-940B-3ACAD293A61B}"/>
+                </a:ext>
+              </a:extLst>
+            </p:cNvPr>
+            <p:cNvCxnSpPr>
+              <a:cxnSpLocks/>
+              <a:stCxn id="7" idx="3"/>
+              <a:endCxn id="8" idx="1"/>
+            </p:cNvCxnSpPr>
+            <p:nvPr/>
+          </p:nvCxnSpPr>
+          <p:spPr>
+            <a:xfrm>
+              <a:off x="4803794" y="1869283"/>
+              <a:ext cx="491836" cy="0"/>
+            </a:xfrm>
+            <a:prstGeom prst="line">
+              <a:avLst/>
+            </a:prstGeom>
+          </p:spPr>
+          <p:style>
+            <a:lnRef idx="1">
+              <a:schemeClr val="dk1"/>
+            </a:lnRef>
+            <a:fillRef idx="0">
+              <a:schemeClr val="dk1"/>
+            </a:fillRef>
+            <a:effectRef idx="0">
+              <a:schemeClr val="dk1"/>
+            </a:effectRef>
+            <a:fontRef idx="minor">
               <a:schemeClr val="tx1"/>
-            </a:solidFill>
-          </a:ln>
-        </p:spPr>
-        <p:style>
-          <a:lnRef idx="2">
-            <a:schemeClr val="accent1">
-              <a:shade val="50000"/>
-            </a:schemeClr>
-          </a:lnRef>
-          <a:fillRef idx="1">
-            <a:schemeClr val="accent1"/>
-          </a:fillRef>
-          <a:effectRef idx="0">
-            <a:schemeClr val="accent1"/>
-          </a:effectRef>
-          <a:fontRef idx="minor">
-            <a:schemeClr val="lt1"/>
-          </a:fontRef>
-        </p:style>
-        <p:txBody>
-          <a:bodyPr rtlCol="0" anchor="ctr"/>
-          <a:lstStyle/>
-          <a:p>
-            <a:pPr algn="ctr"/>
-            <a:r>
-              <a:rPr lang="en-US" dirty="0">
-                <a:solidFill>
-                  <a:sysClr val="windowText" lastClr="000000"/>
-                </a:solidFill>
-                <a:latin typeface="Avenir Book" panose="02000503020000020003" pitchFamily="2" charset="0"/>
-              </a:rPr>
-              <a:t>ATP Synthase Membrane Integration</a:t>
-            </a:r>
-          </a:p>
-        </p:txBody>
-      </p:sp>
-      <p:sp>
-        <p:nvSpPr>
-          <p:cNvPr id="8" name="Rounded Rectangle 7">
-            <a:extLst>
-              <a:ext uri="{FF2B5EF4-FFF2-40B4-BE49-F238E27FC236}">
-                <a16:creationId xmlns:a16="http://schemas.microsoft.com/office/drawing/2014/main" id="{A4CC21EC-B9B0-644D-8B22-F83F2712BEEF}"/>
-              </a:ext>
-            </a:extLst>
-          </p:cNvPr>
-          <p:cNvSpPr/>
-          <p:nvPr/>
-        </p:nvSpPr>
-        <p:spPr>
-          <a:xfrm>
-            <a:off x="5295630" y="1332636"/>
-            <a:ext cx="1943100" cy="1073294"/>
-          </a:xfrm>
-          <a:prstGeom prst="roundRect">
-            <a:avLst/>
-          </a:prstGeom>
-          <a:solidFill>
-            <a:schemeClr val="accent4">
-              <a:lumMod val="20000"/>
-              <a:lumOff val="80000"/>
-            </a:schemeClr>
-          </a:solidFill>
-          <a:ln>
-            <a:solidFill>
+            </a:fontRef>
+          </p:style>
+        </p:cxnSp>
+        <p:cxnSp>
+          <p:nvCxnSpPr>
+            <p:cNvPr id="15" name="Straight Connector 14">
+              <a:extLst>
+                <a:ext uri="{FF2B5EF4-FFF2-40B4-BE49-F238E27FC236}">
+                  <a16:creationId xmlns:a16="http://schemas.microsoft.com/office/drawing/2014/main" id="{1343FE1C-F6FD-0B46-B8DB-679BF1C25E04}"/>
+                </a:ext>
+              </a:extLst>
+            </p:cNvPr>
+            <p:cNvCxnSpPr>
+              <a:cxnSpLocks/>
+              <a:stCxn id="9" idx="3"/>
+              <a:endCxn id="10" idx="1"/>
+            </p:cNvCxnSpPr>
+            <p:nvPr/>
+          </p:nvCxnSpPr>
+          <p:spPr>
+            <a:xfrm>
+              <a:off x="2368858" y="3310428"/>
+              <a:ext cx="491836" cy="0"/>
+            </a:xfrm>
+            <a:prstGeom prst="line">
+              <a:avLst/>
+            </a:prstGeom>
+          </p:spPr>
+          <p:style>
+            <a:lnRef idx="1">
+              <a:schemeClr val="dk1"/>
+            </a:lnRef>
+            <a:fillRef idx="0">
+              <a:schemeClr val="dk1"/>
+            </a:fillRef>
+            <a:effectRef idx="0">
+              <a:schemeClr val="dk1"/>
+            </a:effectRef>
+            <a:fontRef idx="minor">
               <a:schemeClr val="tx1"/>
-            </a:solidFill>
-          </a:ln>
-        </p:spPr>
-        <p:style>
-          <a:lnRef idx="2">
-            <a:schemeClr val="accent1">
-              <a:shade val="50000"/>
-            </a:schemeClr>
-          </a:lnRef>
-          <a:fillRef idx="1">
-            <a:schemeClr val="accent1"/>
-          </a:fillRef>
-          <a:effectRef idx="0">
-            <a:schemeClr val="accent1"/>
-          </a:effectRef>
-          <a:fontRef idx="minor">
-            <a:schemeClr val="lt1"/>
-          </a:fontRef>
-        </p:style>
-        <p:txBody>
-          <a:bodyPr rtlCol="0" anchor="ctr"/>
-          <a:lstStyle/>
-          <a:p>
-            <a:pPr algn="ctr"/>
-            <a:r>
-              <a:rPr lang="en-US" dirty="0">
-                <a:solidFill>
-                  <a:sysClr val="windowText" lastClr="000000"/>
-                </a:solidFill>
-                <a:latin typeface="Avenir Book" panose="02000503020000020003" pitchFamily="2" charset="0"/>
-              </a:rPr>
-              <a:t>ATP Synthesis through ATP Synthase</a:t>
-            </a:r>
-          </a:p>
-        </p:txBody>
-      </p:sp>
-      <p:sp>
-        <p:nvSpPr>
-          <p:cNvPr id="9" name="Rounded Rectangle 8">
-            <a:extLst>
-              <a:ext uri="{FF2B5EF4-FFF2-40B4-BE49-F238E27FC236}">
-                <a16:creationId xmlns:a16="http://schemas.microsoft.com/office/drawing/2014/main" id="{E5DD0724-8EDB-354A-8005-685F9AA9C287}"/>
-              </a:ext>
-            </a:extLst>
-          </p:cNvPr>
-          <p:cNvSpPr/>
-          <p:nvPr/>
-        </p:nvSpPr>
-        <p:spPr>
-          <a:xfrm>
-            <a:off x="425758" y="2773781"/>
-            <a:ext cx="1943100" cy="1073294"/>
-          </a:xfrm>
-          <a:prstGeom prst="roundRect">
-            <a:avLst/>
-          </a:prstGeom>
-          <a:solidFill>
-            <a:schemeClr val="accent6">
-              <a:lumMod val="20000"/>
-              <a:lumOff val="80000"/>
-            </a:schemeClr>
-          </a:solidFill>
-          <a:ln>
-            <a:solidFill>
+            </a:fontRef>
+          </p:style>
+        </p:cxnSp>
+        <p:cxnSp>
+          <p:nvCxnSpPr>
+            <p:cNvPr id="16" name="Straight Connector 15">
+              <a:extLst>
+                <a:ext uri="{FF2B5EF4-FFF2-40B4-BE49-F238E27FC236}">
+                  <a16:creationId xmlns:a16="http://schemas.microsoft.com/office/drawing/2014/main" id="{9005D673-B0E6-0E44-8AE1-346CFC9B3581}"/>
+                </a:ext>
+              </a:extLst>
+            </p:cNvPr>
+            <p:cNvCxnSpPr>
+              <a:cxnSpLocks/>
+              <a:stCxn id="10" idx="3"/>
+              <a:endCxn id="11" idx="1"/>
+            </p:cNvCxnSpPr>
+            <p:nvPr/>
+          </p:nvCxnSpPr>
+          <p:spPr>
+            <a:xfrm>
+              <a:off x="4803794" y="3310428"/>
+              <a:ext cx="491836" cy="0"/>
+            </a:xfrm>
+            <a:prstGeom prst="line">
+              <a:avLst/>
+            </a:prstGeom>
+          </p:spPr>
+          <p:style>
+            <a:lnRef idx="1">
+              <a:schemeClr val="dk1"/>
+            </a:lnRef>
+            <a:fillRef idx="0">
+              <a:schemeClr val="dk1"/>
+            </a:fillRef>
+            <a:effectRef idx="0">
+              <a:schemeClr val="dk1"/>
+            </a:effectRef>
+            <a:fontRef idx="minor">
               <a:schemeClr val="tx1"/>
-            </a:solidFill>
-          </a:ln>
-        </p:spPr>
-        <p:style>
-          <a:lnRef idx="2">
-            <a:schemeClr val="accent1">
-              <a:shade val="50000"/>
-            </a:schemeClr>
-          </a:lnRef>
-          <a:fillRef idx="1">
-            <a:schemeClr val="accent1"/>
-          </a:fillRef>
-          <a:effectRef idx="0">
-            <a:schemeClr val="accent1"/>
-          </a:effectRef>
-          <a:fontRef idx="minor">
-            <a:schemeClr val="lt1"/>
-          </a:fontRef>
-        </p:style>
-        <p:txBody>
-          <a:bodyPr rtlCol="0" anchor="ctr"/>
-          <a:lstStyle/>
-          <a:p>
-            <a:pPr algn="ctr"/>
-            <a:r>
-              <a:rPr lang="en-US" dirty="0">
-                <a:solidFill>
-                  <a:sysClr val="windowText" lastClr="000000"/>
-                </a:solidFill>
-                <a:latin typeface="Avenir Book" panose="02000503020000020003" pitchFamily="2" charset="0"/>
-              </a:rPr>
-              <a:t>Proton Pump Transcription &amp; Translation</a:t>
-            </a:r>
-          </a:p>
-        </p:txBody>
-      </p:sp>
-      <p:sp>
-        <p:nvSpPr>
-          <p:cNvPr id="10" name="Rounded Rectangle 9">
-            <a:extLst>
-              <a:ext uri="{FF2B5EF4-FFF2-40B4-BE49-F238E27FC236}">
-                <a16:creationId xmlns:a16="http://schemas.microsoft.com/office/drawing/2014/main" id="{34AFC73E-F847-3346-A5B1-6C1C6E4D4A12}"/>
-              </a:ext>
-            </a:extLst>
-          </p:cNvPr>
-          <p:cNvSpPr/>
-          <p:nvPr/>
-        </p:nvSpPr>
-        <p:spPr>
-          <a:xfrm>
-            <a:off x="2860694" y="2773781"/>
-            <a:ext cx="1943100" cy="1073294"/>
-          </a:xfrm>
-          <a:prstGeom prst="roundRect">
-            <a:avLst/>
-          </a:prstGeom>
-          <a:solidFill>
-            <a:schemeClr val="accent6">
-              <a:lumMod val="20000"/>
-              <a:lumOff val="80000"/>
-            </a:schemeClr>
-          </a:solidFill>
-          <a:ln>
-            <a:solidFill>
+            </a:fontRef>
+          </p:style>
+        </p:cxnSp>
+        <p:cxnSp>
+          <p:nvCxnSpPr>
+            <p:cNvPr id="17" name="Straight Arrow Connector 16">
+              <a:extLst>
+                <a:ext uri="{FF2B5EF4-FFF2-40B4-BE49-F238E27FC236}">
+                  <a16:creationId xmlns:a16="http://schemas.microsoft.com/office/drawing/2014/main" id="{2F532151-FC6E-8A4F-A128-B4C9DDCE0371}"/>
+                </a:ext>
+              </a:extLst>
+            </p:cNvPr>
+            <p:cNvCxnSpPr>
+              <a:cxnSpLocks/>
+              <a:stCxn id="8" idx="3"/>
+            </p:cNvCxnSpPr>
+            <p:nvPr/>
+          </p:nvCxnSpPr>
+          <p:spPr>
+            <a:xfrm>
+              <a:off x="7238730" y="1869283"/>
+              <a:ext cx="775858" cy="0"/>
+            </a:xfrm>
+            <a:prstGeom prst="straightConnector1">
+              <a:avLst/>
+            </a:prstGeom>
+            <a:ln>
+              <a:tailEnd type="triangle"/>
+            </a:ln>
+          </p:spPr>
+          <p:style>
+            <a:lnRef idx="1">
+              <a:schemeClr val="dk1"/>
+            </a:lnRef>
+            <a:fillRef idx="0">
+              <a:schemeClr val="dk1"/>
+            </a:fillRef>
+            <a:effectRef idx="0">
+              <a:schemeClr val="dk1"/>
+            </a:effectRef>
+            <a:fontRef idx="minor">
               <a:schemeClr val="tx1"/>
-            </a:solidFill>
-          </a:ln>
-        </p:spPr>
-        <p:style>
-          <a:lnRef idx="2">
-            <a:schemeClr val="accent1">
-              <a:shade val="50000"/>
-            </a:schemeClr>
-          </a:lnRef>
-          <a:fillRef idx="1">
-            <a:schemeClr val="accent1"/>
-          </a:fillRef>
-          <a:effectRef idx="0">
-            <a:schemeClr val="accent1"/>
-          </a:effectRef>
-          <a:fontRef idx="minor">
-            <a:schemeClr val="lt1"/>
-          </a:fontRef>
-        </p:style>
-        <p:txBody>
-          <a:bodyPr rtlCol="0" anchor="ctr"/>
-          <a:lstStyle/>
-          <a:p>
-            <a:pPr algn="ctr"/>
-            <a:r>
-              <a:rPr lang="en-US" dirty="0">
-                <a:solidFill>
-                  <a:sysClr val="windowText" lastClr="000000"/>
-                </a:solidFill>
-                <a:latin typeface="Avenir Book" panose="02000503020000020003" pitchFamily="2" charset="0"/>
-              </a:rPr>
-              <a:t>Proton Pump Membrane Integration</a:t>
-            </a:r>
-          </a:p>
-        </p:txBody>
-      </p:sp>
-      <p:sp>
-        <p:nvSpPr>
-          <p:cNvPr id="11" name="Rounded Rectangle 10">
-            <a:extLst>
-              <a:ext uri="{FF2B5EF4-FFF2-40B4-BE49-F238E27FC236}">
-                <a16:creationId xmlns:a16="http://schemas.microsoft.com/office/drawing/2014/main" id="{EF2CAC2B-CB31-EE4D-A539-163299CAE7E0}"/>
-              </a:ext>
-            </a:extLst>
-          </p:cNvPr>
-          <p:cNvSpPr/>
-          <p:nvPr/>
-        </p:nvSpPr>
-        <p:spPr>
-          <a:xfrm>
-            <a:off x="5295630" y="2773781"/>
-            <a:ext cx="1943100" cy="1073294"/>
-          </a:xfrm>
-          <a:prstGeom prst="roundRect">
-            <a:avLst/>
-          </a:prstGeom>
-          <a:solidFill>
-            <a:schemeClr val="accent6">
-              <a:lumMod val="20000"/>
-              <a:lumOff val="80000"/>
-            </a:schemeClr>
-          </a:solidFill>
-          <a:ln>
-            <a:solidFill>
+            </a:fontRef>
+          </p:style>
+        </p:cxnSp>
+        <p:cxnSp>
+          <p:nvCxnSpPr>
+            <p:cNvPr id="18" name="Straight Arrow Connector 17">
+              <a:extLst>
+                <a:ext uri="{FF2B5EF4-FFF2-40B4-BE49-F238E27FC236}">
+                  <a16:creationId xmlns:a16="http://schemas.microsoft.com/office/drawing/2014/main" id="{DFC5AF85-2BC1-1346-B04F-F65DACD1B225}"/>
+                </a:ext>
+              </a:extLst>
+            </p:cNvPr>
+            <p:cNvCxnSpPr>
+              <a:cxnSpLocks/>
+              <a:stCxn id="11" idx="3"/>
+            </p:cNvCxnSpPr>
+            <p:nvPr/>
+          </p:nvCxnSpPr>
+          <p:spPr>
+            <a:xfrm>
+              <a:off x="7238730" y="3310428"/>
+              <a:ext cx="775858" cy="0"/>
+            </a:xfrm>
+            <a:prstGeom prst="straightConnector1">
+              <a:avLst/>
+            </a:prstGeom>
+            <a:ln>
+              <a:tailEnd type="triangle"/>
+            </a:ln>
+          </p:spPr>
+          <p:style>
+            <a:lnRef idx="1">
+              <a:schemeClr val="dk1"/>
+            </a:lnRef>
+            <a:fillRef idx="0">
+              <a:schemeClr val="dk1"/>
+            </a:fillRef>
+            <a:effectRef idx="0">
+              <a:schemeClr val="dk1"/>
+            </a:effectRef>
+            <a:fontRef idx="minor">
               <a:schemeClr val="tx1"/>
-            </a:solidFill>
-          </a:ln>
-        </p:spPr>
-        <p:style>
-          <a:lnRef idx="2">
-            <a:schemeClr val="accent1">
-              <a:shade val="50000"/>
-            </a:schemeClr>
-          </a:lnRef>
-          <a:fillRef idx="1">
-            <a:schemeClr val="accent1"/>
-          </a:fillRef>
-          <a:effectRef idx="0">
-            <a:schemeClr val="accent1"/>
-          </a:effectRef>
-          <a:fontRef idx="minor">
-            <a:schemeClr val="lt1"/>
-          </a:fontRef>
-        </p:style>
-        <p:txBody>
-          <a:bodyPr rtlCol="0" anchor="ctr"/>
-          <a:lstStyle/>
-          <a:p>
-            <a:pPr algn="ctr"/>
-            <a:r>
-              <a:rPr lang="en-US" sz="1600" dirty="0">
-                <a:solidFill>
-                  <a:sysClr val="windowText" lastClr="000000"/>
-                </a:solidFill>
-                <a:latin typeface="Avenir Book" panose="02000503020000020003" pitchFamily="2" charset="0"/>
-              </a:rPr>
-              <a:t>Proton movement through Proton Pump</a:t>
-            </a:r>
-          </a:p>
-        </p:txBody>
-      </p:sp>
-      <p:sp>
-        <p:nvSpPr>
-          <p:cNvPr id="12" name="Rounded Rectangle 11">
-            <a:extLst>
-              <a:ext uri="{FF2B5EF4-FFF2-40B4-BE49-F238E27FC236}">
-                <a16:creationId xmlns:a16="http://schemas.microsoft.com/office/drawing/2014/main" id="{A1BBBE7D-AF24-CA4D-B1FF-A2E565CE28EE}"/>
-              </a:ext>
-            </a:extLst>
-          </p:cNvPr>
-          <p:cNvSpPr/>
-          <p:nvPr/>
-        </p:nvSpPr>
-        <p:spPr>
-          <a:xfrm>
-            <a:off x="425758" y="4218415"/>
-            <a:ext cx="1943100" cy="1073294"/>
-          </a:xfrm>
-          <a:prstGeom prst="roundRect">
-            <a:avLst/>
-          </a:prstGeom>
-          <a:solidFill>
-            <a:schemeClr val="accent2">
-              <a:lumMod val="20000"/>
-              <a:lumOff val="80000"/>
-            </a:schemeClr>
-          </a:solidFill>
-          <a:ln>
-            <a:solidFill>
+            </a:fontRef>
+          </p:style>
+        </p:cxnSp>
+        <p:cxnSp>
+          <p:nvCxnSpPr>
+            <p:cNvPr id="19" name="Straight Arrow Connector 18">
+              <a:extLst>
+                <a:ext uri="{FF2B5EF4-FFF2-40B4-BE49-F238E27FC236}">
+                  <a16:creationId xmlns:a16="http://schemas.microsoft.com/office/drawing/2014/main" id="{73CFE292-3EDB-9C41-B881-F5A29019BB23}"/>
+                </a:ext>
+              </a:extLst>
+            </p:cNvPr>
+            <p:cNvCxnSpPr>
+              <a:cxnSpLocks/>
+              <a:stCxn id="12" idx="3"/>
+            </p:cNvCxnSpPr>
+            <p:nvPr/>
+          </p:nvCxnSpPr>
+          <p:spPr>
+            <a:xfrm>
+              <a:off x="2368858" y="4755062"/>
+              <a:ext cx="5645730" cy="0"/>
+            </a:xfrm>
+            <a:prstGeom prst="straightConnector1">
+              <a:avLst/>
+            </a:prstGeom>
+            <a:ln>
+              <a:tailEnd type="triangle"/>
+            </a:ln>
+          </p:spPr>
+          <p:style>
+            <a:lnRef idx="1">
+              <a:schemeClr val="dk1"/>
+            </a:lnRef>
+            <a:fillRef idx="0">
+              <a:schemeClr val="dk1"/>
+            </a:fillRef>
+            <a:effectRef idx="0">
+              <a:schemeClr val="dk1"/>
+            </a:effectRef>
+            <a:fontRef idx="minor">
               <a:schemeClr val="tx1"/>
-            </a:solidFill>
-          </a:ln>
-        </p:spPr>
-        <p:style>
-          <a:lnRef idx="2">
-            <a:schemeClr val="accent1">
-              <a:shade val="50000"/>
-            </a:schemeClr>
-          </a:lnRef>
-          <a:fillRef idx="1">
-            <a:schemeClr val="accent1"/>
-          </a:fillRef>
-          <a:effectRef idx="0">
-            <a:schemeClr val="accent1"/>
-          </a:effectRef>
-          <a:fontRef idx="minor">
-            <a:schemeClr val="lt1"/>
-          </a:fontRef>
-        </p:style>
-        <p:txBody>
-          <a:bodyPr rtlCol="0" anchor="ctr"/>
-          <a:lstStyle/>
-          <a:p>
-            <a:pPr algn="ctr"/>
-            <a:r>
-              <a:rPr lang="en-US" dirty="0">
-                <a:solidFill>
-                  <a:sysClr val="windowText" lastClr="000000"/>
-                </a:solidFill>
-                <a:latin typeface="Avenir Book" panose="02000503020000020003" pitchFamily="2" charset="0"/>
-              </a:rPr>
-              <a:t>ATP Use</a:t>
-            </a:r>
-          </a:p>
-        </p:txBody>
-      </p:sp>
-      <p:cxnSp>
-        <p:nvCxnSpPr>
-          <p:cNvPr id="13" name="Straight Connector 12">
-            <a:extLst>
-              <a:ext uri="{FF2B5EF4-FFF2-40B4-BE49-F238E27FC236}">
-                <a16:creationId xmlns:a16="http://schemas.microsoft.com/office/drawing/2014/main" id="{626921E6-F3C4-904F-9836-C09F91FA8208}"/>
-              </a:ext>
-            </a:extLst>
-          </p:cNvPr>
-          <p:cNvCxnSpPr>
-            <a:cxnSpLocks/>
-            <a:stCxn id="6" idx="3"/>
-            <a:endCxn id="7" idx="1"/>
-          </p:cNvCxnSpPr>
-          <p:nvPr/>
-        </p:nvCxnSpPr>
-        <p:spPr>
-          <a:xfrm>
-            <a:off x="2368858" y="1869283"/>
-            <a:ext cx="491836" cy="0"/>
-          </a:xfrm>
-          <a:prstGeom prst="line">
-            <a:avLst/>
-          </a:prstGeom>
-        </p:spPr>
-        <p:style>
-          <a:lnRef idx="1">
-            <a:schemeClr val="dk1"/>
-          </a:lnRef>
-          <a:fillRef idx="0">
-            <a:schemeClr val="dk1"/>
-          </a:fillRef>
-          <a:effectRef idx="0">
-            <a:schemeClr val="dk1"/>
-          </a:effectRef>
-          <a:fontRef idx="minor">
-            <a:schemeClr val="tx1"/>
-          </a:fontRef>
-        </p:style>
-      </p:cxnSp>
-      <p:cxnSp>
-        <p:nvCxnSpPr>
-          <p:cNvPr id="14" name="Straight Connector 13">
-            <a:extLst>
-              <a:ext uri="{FF2B5EF4-FFF2-40B4-BE49-F238E27FC236}">
-                <a16:creationId xmlns:a16="http://schemas.microsoft.com/office/drawing/2014/main" id="{E6610521-834B-7B4E-940B-3ACAD293A61B}"/>
-              </a:ext>
-            </a:extLst>
-          </p:cNvPr>
-          <p:cNvCxnSpPr>
-            <a:cxnSpLocks/>
-            <a:stCxn id="7" idx="3"/>
-            <a:endCxn id="8" idx="1"/>
-          </p:cNvCxnSpPr>
-          <p:nvPr/>
-        </p:nvCxnSpPr>
-        <p:spPr>
-          <a:xfrm>
-            <a:off x="4803794" y="1869283"/>
-            <a:ext cx="491836" cy="0"/>
-          </a:xfrm>
-          <a:prstGeom prst="line">
-            <a:avLst/>
-          </a:prstGeom>
-        </p:spPr>
-        <p:style>
-          <a:lnRef idx="1">
-            <a:schemeClr val="dk1"/>
-          </a:lnRef>
-          <a:fillRef idx="0">
-            <a:schemeClr val="dk1"/>
-          </a:fillRef>
-          <a:effectRef idx="0">
-            <a:schemeClr val="dk1"/>
-          </a:effectRef>
-          <a:fontRef idx="minor">
-            <a:schemeClr val="tx1"/>
-          </a:fontRef>
-        </p:style>
-      </p:cxnSp>
-      <p:cxnSp>
-        <p:nvCxnSpPr>
-          <p:cNvPr id="15" name="Straight Connector 14">
-            <a:extLst>
-              <a:ext uri="{FF2B5EF4-FFF2-40B4-BE49-F238E27FC236}">
-                <a16:creationId xmlns:a16="http://schemas.microsoft.com/office/drawing/2014/main" id="{1343FE1C-F6FD-0B46-B8DB-679BF1C25E04}"/>
-              </a:ext>
-            </a:extLst>
-          </p:cNvPr>
-          <p:cNvCxnSpPr>
-            <a:cxnSpLocks/>
-            <a:stCxn id="9" idx="3"/>
-            <a:endCxn id="10" idx="1"/>
-          </p:cNvCxnSpPr>
-          <p:nvPr/>
-        </p:nvCxnSpPr>
-        <p:spPr>
-          <a:xfrm>
-            <a:off x="2368858" y="3310428"/>
-            <a:ext cx="491836" cy="0"/>
-          </a:xfrm>
-          <a:prstGeom prst="line">
-            <a:avLst/>
-          </a:prstGeom>
-        </p:spPr>
-        <p:style>
-          <a:lnRef idx="1">
-            <a:schemeClr val="dk1"/>
-          </a:lnRef>
-          <a:fillRef idx="0">
-            <a:schemeClr val="dk1"/>
-          </a:fillRef>
-          <a:effectRef idx="0">
-            <a:schemeClr val="dk1"/>
-          </a:effectRef>
-          <a:fontRef idx="minor">
-            <a:schemeClr val="tx1"/>
-          </a:fontRef>
-        </p:style>
-      </p:cxnSp>
-      <p:cxnSp>
-        <p:nvCxnSpPr>
-          <p:cNvPr id="16" name="Straight Connector 15">
-            <a:extLst>
-              <a:ext uri="{FF2B5EF4-FFF2-40B4-BE49-F238E27FC236}">
-                <a16:creationId xmlns:a16="http://schemas.microsoft.com/office/drawing/2014/main" id="{9005D673-B0E6-0E44-8AE1-346CFC9B3581}"/>
-              </a:ext>
-            </a:extLst>
-          </p:cNvPr>
-          <p:cNvCxnSpPr>
-            <a:cxnSpLocks/>
-            <a:stCxn id="10" idx="3"/>
-            <a:endCxn id="11" idx="1"/>
-          </p:cNvCxnSpPr>
-          <p:nvPr/>
-        </p:nvCxnSpPr>
-        <p:spPr>
-          <a:xfrm>
-            <a:off x="4803794" y="3310428"/>
-            <a:ext cx="491836" cy="0"/>
-          </a:xfrm>
-          <a:prstGeom prst="line">
-            <a:avLst/>
-          </a:prstGeom>
-        </p:spPr>
-        <p:style>
-          <a:lnRef idx="1">
-            <a:schemeClr val="dk1"/>
-          </a:lnRef>
-          <a:fillRef idx="0">
-            <a:schemeClr val="dk1"/>
-          </a:fillRef>
-          <a:effectRef idx="0">
-            <a:schemeClr val="dk1"/>
-          </a:effectRef>
-          <a:fontRef idx="minor">
-            <a:schemeClr val="tx1"/>
-          </a:fontRef>
-        </p:style>
-      </p:cxnSp>
-      <p:cxnSp>
-        <p:nvCxnSpPr>
-          <p:cNvPr id="17" name="Straight Arrow Connector 16">
-            <a:extLst>
-              <a:ext uri="{FF2B5EF4-FFF2-40B4-BE49-F238E27FC236}">
-                <a16:creationId xmlns:a16="http://schemas.microsoft.com/office/drawing/2014/main" id="{2F532151-FC6E-8A4F-A128-B4C9DDCE0371}"/>
-              </a:ext>
-            </a:extLst>
-          </p:cNvPr>
-          <p:cNvCxnSpPr>
-            <a:cxnSpLocks/>
-            <a:stCxn id="8" idx="3"/>
-          </p:cNvCxnSpPr>
-          <p:nvPr/>
-        </p:nvCxnSpPr>
-        <p:spPr>
-          <a:xfrm>
-            <a:off x="7238730" y="1869283"/>
-            <a:ext cx="775858" cy="0"/>
-          </a:xfrm>
-          <a:prstGeom prst="straightConnector1">
-            <a:avLst/>
-          </a:prstGeom>
-          <a:ln>
-            <a:tailEnd type="triangle"/>
-          </a:ln>
-        </p:spPr>
-        <p:style>
-          <a:lnRef idx="1">
-            <a:schemeClr val="dk1"/>
-          </a:lnRef>
-          <a:fillRef idx="0">
-            <a:schemeClr val="dk1"/>
-          </a:fillRef>
-          <a:effectRef idx="0">
-            <a:schemeClr val="dk1"/>
-          </a:effectRef>
-          <a:fontRef idx="minor">
-            <a:schemeClr val="tx1"/>
-          </a:fontRef>
-        </p:style>
-      </p:cxnSp>
-      <p:cxnSp>
-        <p:nvCxnSpPr>
-          <p:cNvPr id="18" name="Straight Arrow Connector 17">
-            <a:extLst>
-              <a:ext uri="{FF2B5EF4-FFF2-40B4-BE49-F238E27FC236}">
-                <a16:creationId xmlns:a16="http://schemas.microsoft.com/office/drawing/2014/main" id="{DFC5AF85-2BC1-1346-B04F-F65DACD1B225}"/>
-              </a:ext>
-            </a:extLst>
-          </p:cNvPr>
-          <p:cNvCxnSpPr>
-            <a:cxnSpLocks/>
-            <a:stCxn id="11" idx="3"/>
-          </p:cNvCxnSpPr>
-          <p:nvPr/>
-        </p:nvCxnSpPr>
-        <p:spPr>
-          <a:xfrm>
-            <a:off x="7238730" y="3310428"/>
-            <a:ext cx="775858" cy="0"/>
-          </a:xfrm>
-          <a:prstGeom prst="straightConnector1">
-            <a:avLst/>
-          </a:prstGeom>
-          <a:ln>
-            <a:tailEnd type="triangle"/>
-          </a:ln>
-        </p:spPr>
-        <p:style>
-          <a:lnRef idx="1">
-            <a:schemeClr val="dk1"/>
-          </a:lnRef>
-          <a:fillRef idx="0">
-            <a:schemeClr val="dk1"/>
-          </a:fillRef>
-          <a:effectRef idx="0">
-            <a:schemeClr val="dk1"/>
-          </a:effectRef>
-          <a:fontRef idx="minor">
-            <a:schemeClr val="tx1"/>
-          </a:fontRef>
-        </p:style>
-      </p:cxnSp>
-      <p:cxnSp>
-        <p:nvCxnSpPr>
-          <p:cNvPr id="19" name="Straight Arrow Connector 18">
-            <a:extLst>
-              <a:ext uri="{FF2B5EF4-FFF2-40B4-BE49-F238E27FC236}">
-                <a16:creationId xmlns:a16="http://schemas.microsoft.com/office/drawing/2014/main" id="{73CFE292-3EDB-9C41-B881-F5A29019BB23}"/>
-              </a:ext>
-            </a:extLst>
-          </p:cNvPr>
-          <p:cNvCxnSpPr>
-            <a:cxnSpLocks/>
-            <a:stCxn id="12" idx="3"/>
-          </p:cNvCxnSpPr>
-          <p:nvPr/>
-        </p:nvCxnSpPr>
-        <p:spPr>
-          <a:xfrm>
-            <a:off x="2368858" y="4755062"/>
-            <a:ext cx="5645730" cy="0"/>
-          </a:xfrm>
-          <a:prstGeom prst="straightConnector1">
-            <a:avLst/>
-          </a:prstGeom>
-          <a:ln>
-            <a:tailEnd type="triangle"/>
-          </a:ln>
-        </p:spPr>
-        <p:style>
-          <a:lnRef idx="1">
-            <a:schemeClr val="dk1"/>
-          </a:lnRef>
-          <a:fillRef idx="0">
-            <a:schemeClr val="dk1"/>
-          </a:fillRef>
-          <a:effectRef idx="0">
-            <a:schemeClr val="dk1"/>
-          </a:effectRef>
-          <a:fontRef idx="minor">
-            <a:schemeClr val="tx1"/>
-          </a:fontRef>
-        </p:style>
-      </p:cxnSp>
-      <p:sp>
-        <p:nvSpPr>
-          <p:cNvPr id="20" name="TextBox 19">
-            <a:extLst>
-              <a:ext uri="{FF2B5EF4-FFF2-40B4-BE49-F238E27FC236}">
-                <a16:creationId xmlns:a16="http://schemas.microsoft.com/office/drawing/2014/main" id="{419BAF2E-C8A8-E948-89CF-0BB26FEEEE11}"/>
-              </a:ext>
-            </a:extLst>
-          </p:cNvPr>
-          <p:cNvSpPr txBox="1"/>
-          <p:nvPr/>
-        </p:nvSpPr>
-        <p:spPr>
-          <a:xfrm>
-            <a:off x="8216015" y="1653320"/>
-            <a:ext cx="2150918" cy="461665"/>
-          </a:xfrm>
-          <a:prstGeom prst="rect">
-            <a:avLst/>
-          </a:prstGeom>
-          <a:noFill/>
-        </p:spPr>
-        <p:txBody>
-          <a:bodyPr wrap="square" rtlCol="0">
-            <a:spAutoFit/>
-          </a:bodyPr>
-          <a:lstStyle/>
-          <a:p>
-            <a:r>
-              <a:rPr lang="en-US" sz="2400" dirty="0">
-                <a:latin typeface="Avenir Book" panose="02000503020000020003" pitchFamily="2" charset="0"/>
-              </a:rPr>
-              <a:t>ATP Synthesis</a:t>
-            </a:r>
-          </a:p>
-        </p:txBody>
-      </p:sp>
-      <p:sp>
-        <p:nvSpPr>
-          <p:cNvPr id="21" name="TextBox 20">
-            <a:extLst>
-              <a:ext uri="{FF2B5EF4-FFF2-40B4-BE49-F238E27FC236}">
-                <a16:creationId xmlns:a16="http://schemas.microsoft.com/office/drawing/2014/main" id="{C3B5608D-2889-464F-9363-9C08BC2E2ED2}"/>
-              </a:ext>
-            </a:extLst>
-          </p:cNvPr>
-          <p:cNvSpPr txBox="1"/>
-          <p:nvPr/>
-        </p:nvSpPr>
-        <p:spPr>
-          <a:xfrm>
-            <a:off x="8216015" y="2964547"/>
-            <a:ext cx="2493818" cy="830997"/>
-          </a:xfrm>
-          <a:prstGeom prst="rect">
-            <a:avLst/>
-          </a:prstGeom>
-          <a:noFill/>
-        </p:spPr>
-        <p:txBody>
-          <a:bodyPr wrap="square" rtlCol="0">
-            <a:spAutoFit/>
-          </a:bodyPr>
-          <a:lstStyle/>
-          <a:p>
-            <a:r>
-              <a:rPr lang="en-US" sz="2400" dirty="0">
-                <a:latin typeface="Avenir Book" panose="02000503020000020003" pitchFamily="2" charset="0"/>
-              </a:rPr>
-              <a:t>Maintain Proton Gradient</a:t>
-            </a:r>
-          </a:p>
-        </p:txBody>
-      </p:sp>
-      <p:sp>
-        <p:nvSpPr>
-          <p:cNvPr id="22" name="TextBox 21">
-            <a:extLst>
-              <a:ext uri="{FF2B5EF4-FFF2-40B4-BE49-F238E27FC236}">
-                <a16:creationId xmlns:a16="http://schemas.microsoft.com/office/drawing/2014/main" id="{A1C3463E-C3B5-384A-9C85-047396987FCA}"/>
-              </a:ext>
-            </a:extLst>
-          </p:cNvPr>
-          <p:cNvSpPr txBox="1"/>
-          <p:nvPr/>
-        </p:nvSpPr>
-        <p:spPr>
-          <a:xfrm>
-            <a:off x="8216015" y="4503469"/>
-            <a:ext cx="2493818" cy="461665"/>
-          </a:xfrm>
-          <a:prstGeom prst="rect">
-            <a:avLst/>
-          </a:prstGeom>
-          <a:noFill/>
-        </p:spPr>
-        <p:txBody>
-          <a:bodyPr wrap="square" rtlCol="0">
-            <a:spAutoFit/>
-          </a:bodyPr>
-          <a:lstStyle/>
-          <a:p>
-            <a:r>
-              <a:rPr lang="en-US" sz="2400" dirty="0">
-                <a:latin typeface="Avenir Book" panose="02000503020000020003" pitchFamily="2" charset="0"/>
-              </a:rPr>
-              <a:t>ATP Hydrolysis</a:t>
-            </a:r>
-          </a:p>
-        </p:txBody>
-      </p:sp>
-      <p:pic>
-        <p:nvPicPr>
-          <p:cNvPr id="23" name="Picture 22" descr="A picture containing object, clock&#10;&#10;Description automatically generated">
-            <a:extLst>
-              <a:ext uri="{FF2B5EF4-FFF2-40B4-BE49-F238E27FC236}">
-                <a16:creationId xmlns:a16="http://schemas.microsoft.com/office/drawing/2014/main" id="{16213E55-0417-D645-8148-7773788B2D0C}"/>
-              </a:ext>
-            </a:extLst>
-          </p:cNvPr>
-          <p:cNvPicPr>
-            <a:picLocks noChangeAspect="1"/>
-          </p:cNvPicPr>
-          <p:nvPr/>
-        </p:nvPicPr>
-        <p:blipFill>
-          <a:blip r:embed="rId2"/>
-          <a:stretch>
-            <a:fillRect/>
-          </a:stretch>
-        </p:blipFill>
-        <p:spPr>
-          <a:xfrm>
-            <a:off x="10385873" y="1107757"/>
-            <a:ext cx="1787378" cy="1400367"/>
-          </a:xfrm>
-          <a:prstGeom prst="rect">
-            <a:avLst/>
-          </a:prstGeom>
-        </p:spPr>
-      </p:pic>
-      <p:pic>
-        <p:nvPicPr>
-          <p:cNvPr id="24" name="Picture 23" descr="A picture containing clock&#10;&#10;Description automatically generated">
-            <a:extLst>
-              <a:ext uri="{FF2B5EF4-FFF2-40B4-BE49-F238E27FC236}">
-                <a16:creationId xmlns:a16="http://schemas.microsoft.com/office/drawing/2014/main" id="{C888CBBC-0160-DE47-8065-54B33CAE1289}"/>
-              </a:ext>
-            </a:extLst>
-          </p:cNvPr>
-          <p:cNvPicPr>
-            <a:picLocks noChangeAspect="1"/>
-          </p:cNvPicPr>
-          <p:nvPr/>
-        </p:nvPicPr>
-        <p:blipFill>
-          <a:blip r:embed="rId3"/>
-          <a:stretch>
-            <a:fillRect/>
-          </a:stretch>
-        </p:blipFill>
-        <p:spPr>
-          <a:xfrm>
-            <a:off x="10585888" y="2660265"/>
-            <a:ext cx="1534484" cy="1300326"/>
-          </a:xfrm>
-          <a:prstGeom prst="rect">
-            <a:avLst/>
-          </a:prstGeom>
-        </p:spPr>
-      </p:pic>
-      <p:pic>
-        <p:nvPicPr>
-          <p:cNvPr id="25" name="Picture 24" descr="A picture containing object, clock&#10;&#10;Description automatically generated">
-            <a:extLst>
-              <a:ext uri="{FF2B5EF4-FFF2-40B4-BE49-F238E27FC236}">
-                <a16:creationId xmlns:a16="http://schemas.microsoft.com/office/drawing/2014/main" id="{DE36C045-EFC4-E746-9B90-B4F652767E07}"/>
-              </a:ext>
-            </a:extLst>
-          </p:cNvPr>
-          <p:cNvPicPr>
-            <a:picLocks noChangeAspect="1"/>
-          </p:cNvPicPr>
-          <p:nvPr/>
-        </p:nvPicPr>
-        <p:blipFill>
-          <a:blip r:embed="rId4"/>
-          <a:stretch>
-            <a:fillRect/>
-          </a:stretch>
-        </p:blipFill>
-        <p:spPr>
-          <a:xfrm>
-            <a:off x="10585889" y="4151476"/>
-            <a:ext cx="1381322" cy="1387199"/>
-          </a:xfrm>
-          <a:prstGeom prst="rect">
-            <a:avLst/>
-          </a:prstGeom>
-        </p:spPr>
-      </p:pic>
+            </a:fontRef>
+          </p:style>
+        </p:cxnSp>
+        <p:sp>
+          <p:nvSpPr>
+            <p:cNvPr id="20" name="TextBox 19">
+              <a:extLst>
+                <a:ext uri="{FF2B5EF4-FFF2-40B4-BE49-F238E27FC236}">
+                  <a16:creationId xmlns:a16="http://schemas.microsoft.com/office/drawing/2014/main" id="{419BAF2E-C8A8-E948-89CF-0BB26FEEEE11}"/>
+                </a:ext>
+              </a:extLst>
+            </p:cNvPr>
+            <p:cNvSpPr txBox="1"/>
+            <p:nvPr/>
+          </p:nvSpPr>
+          <p:spPr>
+            <a:xfrm>
+              <a:off x="8216015" y="1653320"/>
+              <a:ext cx="2150918" cy="461665"/>
+            </a:xfrm>
+            <a:prstGeom prst="rect">
+              <a:avLst/>
+            </a:prstGeom>
+            <a:noFill/>
+          </p:spPr>
+          <p:txBody>
+            <a:bodyPr wrap="square" rtlCol="0">
+              <a:spAutoFit/>
+            </a:bodyPr>
+            <a:lstStyle/>
+            <a:p>
+              <a:r>
+                <a:rPr lang="en-US" sz="2400" dirty="0">
+                  <a:latin typeface="Avenir Book" panose="02000503020000020003" pitchFamily="2" charset="0"/>
+                </a:rPr>
+                <a:t>ATP Synthesis</a:t>
+              </a:r>
+            </a:p>
+          </p:txBody>
+        </p:sp>
+        <p:sp>
+          <p:nvSpPr>
+            <p:cNvPr id="21" name="TextBox 20">
+              <a:extLst>
+                <a:ext uri="{FF2B5EF4-FFF2-40B4-BE49-F238E27FC236}">
+                  <a16:creationId xmlns:a16="http://schemas.microsoft.com/office/drawing/2014/main" id="{C3B5608D-2889-464F-9363-9C08BC2E2ED2}"/>
+                </a:ext>
+              </a:extLst>
+            </p:cNvPr>
+            <p:cNvSpPr txBox="1"/>
+            <p:nvPr/>
+          </p:nvSpPr>
+          <p:spPr>
+            <a:xfrm>
+              <a:off x="8216015" y="2964547"/>
+              <a:ext cx="2493818" cy="830997"/>
+            </a:xfrm>
+            <a:prstGeom prst="rect">
+              <a:avLst/>
+            </a:prstGeom>
+            <a:noFill/>
+          </p:spPr>
+          <p:txBody>
+            <a:bodyPr wrap="square" rtlCol="0">
+              <a:spAutoFit/>
+            </a:bodyPr>
+            <a:lstStyle/>
+            <a:p>
+              <a:r>
+                <a:rPr lang="en-US" sz="2400" dirty="0">
+                  <a:latin typeface="Avenir Book" panose="02000503020000020003" pitchFamily="2" charset="0"/>
+                </a:rPr>
+                <a:t>Maintain Proton Gradient</a:t>
+              </a:r>
+            </a:p>
+          </p:txBody>
+        </p:sp>
+        <p:sp>
+          <p:nvSpPr>
+            <p:cNvPr id="22" name="TextBox 21">
+              <a:extLst>
+                <a:ext uri="{FF2B5EF4-FFF2-40B4-BE49-F238E27FC236}">
+                  <a16:creationId xmlns:a16="http://schemas.microsoft.com/office/drawing/2014/main" id="{A1C3463E-C3B5-384A-9C85-047396987FCA}"/>
+                </a:ext>
+              </a:extLst>
+            </p:cNvPr>
+            <p:cNvSpPr txBox="1"/>
+            <p:nvPr/>
+          </p:nvSpPr>
+          <p:spPr>
+            <a:xfrm>
+              <a:off x="8216015" y="4503469"/>
+              <a:ext cx="2493818" cy="461665"/>
+            </a:xfrm>
+            <a:prstGeom prst="rect">
+              <a:avLst/>
+            </a:prstGeom>
+            <a:noFill/>
+          </p:spPr>
+          <p:txBody>
+            <a:bodyPr wrap="square" rtlCol="0">
+              <a:spAutoFit/>
+            </a:bodyPr>
+            <a:lstStyle/>
+            <a:p>
+              <a:r>
+                <a:rPr lang="en-US" sz="2400" dirty="0">
+                  <a:latin typeface="Avenir Book" panose="02000503020000020003" pitchFamily="2" charset="0"/>
+                </a:rPr>
+                <a:t>ATP Hydrolysis</a:t>
+              </a:r>
+            </a:p>
+          </p:txBody>
+        </p:sp>
+        <p:pic>
+          <p:nvPicPr>
+            <p:cNvPr id="23" name="Picture 22" descr="A picture containing object, clock&#10;&#10;Description automatically generated">
+              <a:extLst>
+                <a:ext uri="{FF2B5EF4-FFF2-40B4-BE49-F238E27FC236}">
+                  <a16:creationId xmlns:a16="http://schemas.microsoft.com/office/drawing/2014/main" id="{16213E55-0417-D645-8148-7773788B2D0C}"/>
+                </a:ext>
+              </a:extLst>
+            </p:cNvPr>
+            <p:cNvPicPr>
+              <a:picLocks noChangeAspect="1"/>
+            </p:cNvPicPr>
+            <p:nvPr/>
+          </p:nvPicPr>
+          <p:blipFill>
+            <a:blip r:embed="rId2"/>
+            <a:stretch>
+              <a:fillRect/>
+            </a:stretch>
+          </p:blipFill>
+          <p:spPr>
+            <a:xfrm>
+              <a:off x="10385873" y="1107757"/>
+              <a:ext cx="1787378" cy="1400367"/>
+            </a:xfrm>
+            <a:prstGeom prst="rect">
+              <a:avLst/>
+            </a:prstGeom>
+          </p:spPr>
+        </p:pic>
+        <p:pic>
+          <p:nvPicPr>
+            <p:cNvPr id="24" name="Picture 23" descr="A picture containing clock&#10;&#10;Description automatically generated">
+              <a:extLst>
+                <a:ext uri="{FF2B5EF4-FFF2-40B4-BE49-F238E27FC236}">
+                  <a16:creationId xmlns:a16="http://schemas.microsoft.com/office/drawing/2014/main" id="{C888CBBC-0160-DE47-8065-54B33CAE1289}"/>
+                </a:ext>
+              </a:extLst>
+            </p:cNvPr>
+            <p:cNvPicPr>
+              <a:picLocks noChangeAspect="1"/>
+            </p:cNvPicPr>
+            <p:nvPr/>
+          </p:nvPicPr>
+          <p:blipFill>
+            <a:blip r:embed="rId3"/>
+            <a:stretch>
+              <a:fillRect/>
+            </a:stretch>
+          </p:blipFill>
+          <p:spPr>
+            <a:xfrm>
+              <a:off x="10585888" y="2660265"/>
+              <a:ext cx="1534484" cy="1300326"/>
+            </a:xfrm>
+            <a:prstGeom prst="rect">
+              <a:avLst/>
+            </a:prstGeom>
+          </p:spPr>
+        </p:pic>
+        <p:pic>
+          <p:nvPicPr>
+            <p:cNvPr id="25" name="Picture 24" descr="A picture containing object, clock&#10;&#10;Description automatically generated">
+              <a:extLst>
+                <a:ext uri="{FF2B5EF4-FFF2-40B4-BE49-F238E27FC236}">
+                  <a16:creationId xmlns:a16="http://schemas.microsoft.com/office/drawing/2014/main" id="{DE36C045-EFC4-E746-9B90-B4F652767E07}"/>
+                </a:ext>
+              </a:extLst>
+            </p:cNvPr>
+            <p:cNvPicPr>
+              <a:picLocks noChangeAspect="1"/>
+            </p:cNvPicPr>
+            <p:nvPr/>
+          </p:nvPicPr>
+          <p:blipFill>
+            <a:blip r:embed="rId4"/>
+            <a:stretch>
+              <a:fillRect/>
+            </a:stretch>
+          </p:blipFill>
+          <p:spPr>
+            <a:xfrm>
+              <a:off x="10585889" y="4151476"/>
+              <a:ext cx="1381322" cy="1387199"/>
+            </a:xfrm>
+            <a:prstGeom prst="rect">
+              <a:avLst/>
+            </a:prstGeom>
+          </p:spPr>
+        </p:pic>
+      </p:grpSp>
     </p:spTree>
     <p:extLst>
       <p:ext uri="{BB962C8B-B14F-4D97-AF65-F5344CB8AC3E}">
@@ -19462,7 +19855,7 @@
           </p:xfrm>
           <a:graphic>
             <a:graphicData uri="http://schemas.openxmlformats.org/drawingml/2006/diagram">
-              <dgm:relIds xmlns:dgm="http://schemas.openxmlformats.org/drawingml/2006/diagram" xmlns:r="http://schemas.openxmlformats.org/officeDocument/2006/relationships" r:dm="rId2" r:lo="rId3" r:qs="rId4" r:cs="rId5"/>
+              <dgm:relIds xmlns:dgm="http://schemas.openxmlformats.org/drawingml/2006/diagram" xmlns:r="http://schemas.openxmlformats.org/officeDocument/2006/relationships" r:dm="rId3" r:lo="rId4" r:qs="rId5" r:cs="rId6"/>
             </a:graphicData>
           </a:graphic>
         </p:graphicFrame>
@@ -19721,7 +20114,7 @@
           <p:nvPr/>
         </p:nvPicPr>
         <p:blipFill>
-          <a:blip r:embed="rId7"/>
+          <a:blip r:embed="rId8"/>
           <a:stretch>
             <a:fillRect/>
           </a:stretch>
@@ -19751,7 +20144,7 @@
           <p:nvPr/>
         </p:nvPicPr>
         <p:blipFill>
-          <a:blip r:embed="rId8"/>
+          <a:blip r:embed="rId9"/>
           <a:stretch>
             <a:fillRect/>
           </a:stretch>
@@ -19781,7 +20174,7 @@
           <p:nvPr/>
         </p:nvPicPr>
         <p:blipFill>
-          <a:blip r:embed="rId9"/>
+          <a:blip r:embed="rId10"/>
           <a:stretch>
             <a:fillRect/>
           </a:stretch>
@@ -19796,6 +20189,73 @@
           </a:prstGeom>
         </p:spPr>
       </p:pic>
+      <p:sp>
+        <p:nvSpPr>
+          <p:cNvPr id="33" name="TextBox 32">
+            <a:extLst>
+              <a:ext uri="{FF2B5EF4-FFF2-40B4-BE49-F238E27FC236}">
+                <a16:creationId xmlns:a16="http://schemas.microsoft.com/office/drawing/2014/main" id="{48EC7D4E-13AB-4B4A-B6C3-C7FBA27020BF}"/>
+              </a:ext>
+            </a:extLst>
+          </p:cNvPr>
+          <p:cNvSpPr txBox="1"/>
+          <p:nvPr/>
+        </p:nvSpPr>
+        <p:spPr>
+          <a:xfrm>
+            <a:off x="400326" y="965046"/>
+            <a:ext cx="11162547" cy="369332"/>
+          </a:xfrm>
+          <a:prstGeom prst="rect">
+            <a:avLst/>
+          </a:prstGeom>
+          <a:noFill/>
+        </p:spPr>
+        <p:txBody>
+          <a:bodyPr wrap="square" rtlCol="0">
+            <a:spAutoFit/>
+          </a:bodyPr>
+          <a:lstStyle/>
+          <a:p>
+            <a:r>
+              <a:rPr lang="en-US" b="1" dirty="0">
+                <a:latin typeface="Avenir Book" panose="02000503020000020003" pitchFamily="2" charset="0"/>
+              </a:rPr>
+              <a:t>Initial Conditions - </a:t>
+            </a:r>
+            <a:r>
+              <a:rPr lang="en-US" dirty="0">
+                <a:latin typeface="Avenir Book" panose="02000503020000020003" pitchFamily="2" charset="0"/>
+              </a:rPr>
+              <a:t>Tx/Tl Machinery, </a:t>
+            </a:r>
+            <a:r>
+              <a:rPr lang="en-US" dirty="0" err="1">
+                <a:latin typeface="Avenir Book" panose="02000503020000020003" pitchFamily="2" charset="0"/>
+              </a:rPr>
+              <a:t>outside_H</a:t>
+            </a:r>
+            <a:r>
+              <a:rPr lang="en-US" dirty="0">
+                <a:latin typeface="Avenir Book" panose="02000503020000020003" pitchFamily="2" charset="0"/>
+              </a:rPr>
+              <a:t>, </a:t>
+            </a:r>
+            <a:r>
+              <a:rPr lang="en-US" dirty="0" err="1">
+                <a:latin typeface="Avenir Book" panose="02000503020000020003" pitchFamily="2" charset="0"/>
+              </a:rPr>
+              <a:t>dna</a:t>
+            </a:r>
+            <a:r>
+              <a:rPr lang="en-US" dirty="0">
+                <a:latin typeface="Avenir Book" panose="02000503020000020003" pitchFamily="2" charset="0"/>
+              </a:rPr>
+              <a:t> for protein, ATP: 10 nM</a:t>
+            </a:r>
+          </a:p>
+        </p:txBody>
+      </p:sp>
     </p:spTree>
     <p:extLst>
       <p:ext uri="{BB962C8B-B14F-4D97-AF65-F5344CB8AC3E}">
@@ -20219,7 +20679,7 @@
         </p:nvGrpSpPr>
         <p:grpSpPr>
           <a:xfrm>
-            <a:off x="6703142" y="1751440"/>
+            <a:off x="8131475" y="1795315"/>
             <a:ext cx="3386487" cy="3803915"/>
             <a:chOff x="6703142" y="1751440"/>
             <a:chExt cx="3386487" cy="3803915"/>
@@ -20892,7 +21352,7 @@
             </p:xfrm>
             <a:graphic>
               <a:graphicData uri="http://schemas.openxmlformats.org/drawingml/2006/diagram">
-                <dgm:relIds xmlns:dgm="http://schemas.openxmlformats.org/drawingml/2006/diagram" xmlns:r="http://schemas.openxmlformats.org/officeDocument/2006/relationships" r:dm="rId2" r:lo="rId3" r:qs="rId4" r:cs="rId5"/>
+                <dgm:relIds xmlns:dgm="http://schemas.openxmlformats.org/drawingml/2006/diagram" xmlns:r="http://schemas.openxmlformats.org/officeDocument/2006/relationships" r:dm="rId3" r:lo="rId4" r:qs="rId5" r:cs="rId6"/>
               </a:graphicData>
             </a:graphic>
           </p:graphicFrame>
@@ -21139,10 +21599,10 @@
       </p:grpSp>
       <p:pic>
         <p:nvPicPr>
-          <p:cNvPr id="36" name="Picture 35" descr="A close up of a map&#10;&#10;Description automatically generated">
+          <p:cNvPr id="40" name="Picture 39" descr="A close up of a map&#10;&#10;Description automatically generated">
             <a:extLst>
               <a:ext uri="{FF2B5EF4-FFF2-40B4-BE49-F238E27FC236}">
-                <a16:creationId xmlns:a16="http://schemas.microsoft.com/office/drawing/2014/main" id="{C61A7383-078E-9F49-B7CC-7917BFCF2D0C}"/>
+                <a16:creationId xmlns:a16="http://schemas.microsoft.com/office/drawing/2014/main" id="{DF506DB0-0717-9342-91A0-713804C95CA2}"/>
               </a:ext>
             </a:extLst>
           </p:cNvPr>
@@ -21152,15 +21612,15 @@
           <p:nvPr/>
         </p:nvPicPr>
         <p:blipFill>
-          <a:blip r:embed="rId7"/>
+          <a:blip r:embed="rId8"/>
           <a:stretch>
             <a:fillRect/>
           </a:stretch>
         </p:blipFill>
         <p:spPr>
           <a:xfrm>
-            <a:off x="628105" y="1577678"/>
-            <a:ext cx="5878286" cy="4572000"/>
+            <a:off x="1126275" y="1462028"/>
+            <a:ext cx="5715000" cy="4445000"/>
           </a:xfrm>
           <a:prstGeom prst="rect">
             <a:avLst/>

</xml_diff>

<commit_message>
interim report, presentations, collabs
</commit_message>
<xml_diff>
--- a/miscellaneous/presentations/20200825_labmtg.pptx
+++ b/miscellaneous/presentations/20200825_labmtg.pptx
@@ -11,7 +11,7 @@
     <p:sldId id="256" r:id="rId2"/>
     <p:sldId id="271" r:id="rId3"/>
     <p:sldId id="270" r:id="rId4"/>
-    <p:sldId id="272" r:id="rId5"/>
+    <p:sldId id="284" r:id="rId5"/>
     <p:sldId id="273" r:id="rId6"/>
     <p:sldId id="274" r:id="rId7"/>
     <p:sldId id="275" r:id="rId8"/>
@@ -6486,7 +6486,7 @@
           <a:p>
             <a:fld id="{1F6016E2-DE12-334C-8C04-EFBA018766FA}" type="datetimeFigureOut">
               <a:rPr lang="en-US" smtClean="0"/>
-              <a:t>8/23/20</a:t>
+              <a:t>8/24/20</a:t>
             </a:fld>
             <a:endParaRPr lang="en-US"/>
           </a:p>
@@ -6818,7 +6818,7 @@
           <a:p>
             <a:fld id="{E664AA93-6F0D-5A4C-B7F1-05D840C85487}" type="slidenum">
               <a:rPr lang="en-US" smtClean="0"/>
-              <a:t>5</a:t>
+              <a:t>4</a:t>
             </a:fld>
             <a:endParaRPr lang="en-US"/>
           </a:p>
@@ -6827,7 +6827,7 @@
     </p:spTree>
     <p:extLst>
       <p:ext uri="{BB962C8B-B14F-4D97-AF65-F5344CB8AC3E}">
-        <p14:creationId xmlns:p14="http://schemas.microsoft.com/office/powerpoint/2010/main" val="4044222828"/>
+        <p14:creationId xmlns:p14="http://schemas.microsoft.com/office/powerpoint/2010/main" val="3764383001"/>
       </p:ext>
     </p:extLst>
   </p:cSld>
@@ -6902,7 +6902,7 @@
           <a:p>
             <a:fld id="{E664AA93-6F0D-5A4C-B7F1-05D840C85487}" type="slidenum">
               <a:rPr lang="en-US" smtClean="0"/>
-              <a:t>8</a:t>
+              <a:t>5</a:t>
             </a:fld>
             <a:endParaRPr lang="en-US"/>
           </a:p>
@@ -6911,7 +6911,7 @@
     </p:spTree>
     <p:extLst>
       <p:ext uri="{BB962C8B-B14F-4D97-AF65-F5344CB8AC3E}">
-        <p14:creationId xmlns:p14="http://schemas.microsoft.com/office/powerpoint/2010/main" val="2616987978"/>
+        <p14:creationId xmlns:p14="http://schemas.microsoft.com/office/powerpoint/2010/main" val="4044222828"/>
       </p:ext>
     </p:extLst>
   </p:cSld>
@@ -6965,6 +6965,180 @@
           <a:bodyPr/>
           <a:lstStyle/>
           <a:p>
+            <a:r>
+              <a:rPr lang="en-US" dirty="0"/>
+              <a:t>Proton pump = </a:t>
+            </a:r>
+            <a:r>
+              <a:rPr lang="en-US" sz="1200" b="0" i="0" kern="1200" dirty="0">
+                <a:solidFill>
+                  <a:schemeClr val="tx1"/>
+                </a:solidFill>
+                <a:effectLst/>
+                <a:latin typeface="+mn-lt"/>
+                <a:ea typeface="+mn-ea"/>
+                <a:cs typeface="+mn-cs"/>
+              </a:rPr>
+              <a:t>Plasma membrane H+-ATPase</a:t>
+            </a:r>
+          </a:p>
+          <a:p>
+            <a:pPr marL="0" marR="0" lvl="0" indent="0" algn="l" defTabSz="914400" rtl="0" eaLnBrk="1" fontAlgn="auto" latinLnBrk="0" hangingPunct="1">
+              <a:lnSpc>
+                <a:spcPct val="100000"/>
+              </a:lnSpc>
+              <a:spcBef>
+                <a:spcPts val="0"/>
+              </a:spcBef>
+              <a:spcAft>
+                <a:spcPts val="0"/>
+              </a:spcAft>
+              <a:buClrTx/>
+              <a:buSzTx/>
+              <a:buFontTx/>
+              <a:buNone/>
+              <a:tabLst/>
+              <a:defRPr/>
+            </a:pPr>
+            <a:r>
+              <a:rPr lang="en-US" sz="1200" b="1" i="0" kern="1200" dirty="0">
+                <a:solidFill>
+                  <a:schemeClr val="tx1"/>
+                </a:solidFill>
+                <a:effectLst/>
+                <a:latin typeface="+mn-lt"/>
+                <a:ea typeface="+mn-ea"/>
+                <a:cs typeface="+mn-cs"/>
+              </a:rPr>
+              <a:t>P-type proton ATPase</a:t>
+            </a:r>
+          </a:p>
+          <a:p>
+            <a:r>
+              <a:rPr lang="en-US" sz="1200" b="0" i="0" kern="1200" dirty="0">
+                <a:solidFill>
+                  <a:schemeClr val="tx1"/>
+                </a:solidFill>
+                <a:effectLst/>
+                <a:latin typeface="+mn-lt"/>
+                <a:ea typeface="+mn-ea"/>
+                <a:cs typeface="+mn-cs"/>
+              </a:rPr>
+              <a:t>found in the plasma membrane of </a:t>
+            </a:r>
+            <a:r>
+              <a:rPr lang="en-US" sz="1200" b="0" i="0" u="none" strike="noStrike" kern="1200" dirty="0">
+                <a:solidFill>
+                  <a:schemeClr val="tx1"/>
+                </a:solidFill>
+                <a:effectLst/>
+                <a:latin typeface="+mn-lt"/>
+                <a:ea typeface="+mn-ea"/>
+                <a:cs typeface="+mn-cs"/>
+                <a:hlinkClick r:id="rId3" tooltip="Plants"/>
+              </a:rPr>
+              <a:t>plants</a:t>
+            </a:r>
+            <a:r>
+              <a:rPr lang="en-US" sz="1200" b="0" i="0" kern="1200" dirty="0">
+                <a:solidFill>
+                  <a:schemeClr val="tx1"/>
+                </a:solidFill>
+                <a:effectLst/>
+                <a:latin typeface="+mn-lt"/>
+                <a:ea typeface="+mn-ea"/>
+                <a:cs typeface="+mn-cs"/>
+              </a:rPr>
+              <a:t>, </a:t>
+            </a:r>
+            <a:r>
+              <a:rPr lang="en-US" sz="1200" b="0" i="0" u="none" strike="noStrike" kern="1200" dirty="0">
+                <a:solidFill>
+                  <a:schemeClr val="tx1"/>
+                </a:solidFill>
+                <a:effectLst/>
+                <a:latin typeface="+mn-lt"/>
+                <a:ea typeface="+mn-ea"/>
+                <a:cs typeface="+mn-cs"/>
+                <a:hlinkClick r:id="rId4" tooltip="Fungi"/>
+              </a:rPr>
+              <a:t>fungi</a:t>
+            </a:r>
+            <a:r>
+              <a:rPr lang="en-US" sz="1200" b="0" i="0" kern="1200" dirty="0">
+                <a:solidFill>
+                  <a:schemeClr val="tx1"/>
+                </a:solidFill>
+                <a:effectLst/>
+                <a:latin typeface="+mn-lt"/>
+                <a:ea typeface="+mn-ea"/>
+                <a:cs typeface="+mn-cs"/>
+              </a:rPr>
+              <a:t>, </a:t>
+            </a:r>
+            <a:r>
+              <a:rPr lang="en-US" sz="1200" b="0" i="0" u="none" strike="noStrike" kern="1200" dirty="0">
+                <a:solidFill>
+                  <a:schemeClr val="tx1"/>
+                </a:solidFill>
+                <a:effectLst/>
+                <a:latin typeface="+mn-lt"/>
+                <a:ea typeface="+mn-ea"/>
+                <a:cs typeface="+mn-cs"/>
+                <a:hlinkClick r:id="rId5" tooltip="Protists"/>
+              </a:rPr>
+              <a:t>protists</a:t>
+            </a:r>
+            <a:r>
+              <a:rPr lang="en-US" sz="1200" b="0" i="0" kern="1200" dirty="0">
+                <a:solidFill>
+                  <a:schemeClr val="tx1"/>
+                </a:solidFill>
+                <a:effectLst/>
+                <a:latin typeface="+mn-lt"/>
+                <a:ea typeface="+mn-ea"/>
+                <a:cs typeface="+mn-cs"/>
+              </a:rPr>
+              <a:t> and many </a:t>
+            </a:r>
+            <a:r>
+              <a:rPr lang="en-US" sz="1200" b="0" i="0" u="none" strike="noStrike" kern="1200" dirty="0">
+                <a:solidFill>
+                  <a:schemeClr val="tx1"/>
+                </a:solidFill>
+                <a:effectLst/>
+                <a:latin typeface="+mn-lt"/>
+                <a:ea typeface="+mn-ea"/>
+                <a:cs typeface="+mn-cs"/>
+                <a:hlinkClick r:id="rId6" tooltip="Prokaryotes"/>
+              </a:rPr>
+              <a:t>prokaryotes</a:t>
+            </a:r>
+            <a:r>
+              <a:rPr lang="en-US" sz="1200" b="0" i="0" kern="1200" dirty="0">
+                <a:solidFill>
+                  <a:schemeClr val="tx1"/>
+                </a:solidFill>
+                <a:effectLst/>
+                <a:latin typeface="+mn-lt"/>
+                <a:ea typeface="+mn-ea"/>
+                <a:cs typeface="+mn-cs"/>
+              </a:rPr>
+              <a:t>.</a:t>
+            </a:r>
+          </a:p>
+          <a:p>
+            <a:endParaRPr lang="en-US" sz="1200" b="0" i="0" kern="1200" dirty="0">
+              <a:solidFill>
+                <a:schemeClr val="tx1"/>
+              </a:solidFill>
+              <a:effectLst/>
+              <a:latin typeface="+mn-lt"/>
+              <a:ea typeface="+mn-ea"/>
+              <a:cs typeface="+mn-cs"/>
+            </a:endParaRPr>
+          </a:p>
+          <a:p>
             <a:endParaRPr lang="en-US" dirty="0"/>
           </a:p>
         </p:txBody>
@@ -6986,7 +7160,7 @@
           <a:p>
             <a:fld id="{E664AA93-6F0D-5A4C-B7F1-05D840C85487}" type="slidenum">
               <a:rPr lang="en-US" smtClean="0"/>
-              <a:t>9</a:t>
+              <a:t>7</a:t>
             </a:fld>
             <a:endParaRPr lang="en-US"/>
           </a:p>
@@ -6995,7 +7169,7 @@
     </p:spTree>
     <p:extLst>
       <p:ext uri="{BB962C8B-B14F-4D97-AF65-F5344CB8AC3E}">
-        <p14:creationId xmlns:p14="http://schemas.microsoft.com/office/powerpoint/2010/main" val="3301886910"/>
+        <p14:creationId xmlns:p14="http://schemas.microsoft.com/office/powerpoint/2010/main" val="3650279148"/>
       </p:ext>
     </p:extLst>
   </p:cSld>
@@ -7049,14 +7223,7 @@
           <a:bodyPr/>
           <a:lstStyle/>
           <a:p>
-            <a:r>
-              <a:rPr lang="en-US" dirty="0">
-                <a:solidFill>
-                  <a:srgbClr val="FF0000"/>
-                </a:solidFill>
-              </a:rPr>
-              <a:t>Recheck plots</a:t>
-            </a:r>
+            <a:endParaRPr lang="en-US" dirty="0"/>
           </a:p>
         </p:txBody>
       </p:sp>
@@ -7077,7 +7244,7 @@
           <a:p>
             <a:fld id="{E664AA93-6F0D-5A4C-B7F1-05D840C85487}" type="slidenum">
               <a:rPr lang="en-US" smtClean="0"/>
-              <a:t>10</a:t>
+              <a:t>8</a:t>
             </a:fld>
             <a:endParaRPr lang="en-US"/>
           </a:p>
@@ -7086,7 +7253,7 @@
     </p:spTree>
     <p:extLst>
       <p:ext uri="{BB962C8B-B14F-4D97-AF65-F5344CB8AC3E}">
-        <p14:creationId xmlns:p14="http://schemas.microsoft.com/office/powerpoint/2010/main" val="1608150766"/>
+        <p14:creationId xmlns:p14="http://schemas.microsoft.com/office/powerpoint/2010/main" val="2616987978"/>
       </p:ext>
     </p:extLst>
   </p:cSld>
@@ -7161,6 +7328,181 @@
           <a:p>
             <a:fld id="{E664AA93-6F0D-5A4C-B7F1-05D840C85487}" type="slidenum">
               <a:rPr lang="en-US" smtClean="0"/>
+              <a:t>9</a:t>
+            </a:fld>
+            <a:endParaRPr lang="en-US"/>
+          </a:p>
+        </p:txBody>
+      </p:sp>
+    </p:spTree>
+    <p:extLst>
+      <p:ext uri="{BB962C8B-B14F-4D97-AF65-F5344CB8AC3E}">
+        <p14:creationId xmlns:p14="http://schemas.microsoft.com/office/powerpoint/2010/main" val="3301886910"/>
+      </p:ext>
+    </p:extLst>
+  </p:cSld>
+  <p:clrMapOvr>
+    <a:masterClrMapping/>
+  </p:clrMapOvr>
+</p:notes>
+</file>
+
+<file path=ppt/notesSlides/notesSlide6.xml><?xml version="1.0" encoding="utf-8"?>
+<p:notes xmlns:a="http://schemas.openxmlformats.org/drawingml/2006/main" xmlns:r="http://schemas.openxmlformats.org/officeDocument/2006/relationships" xmlns:p="http://schemas.openxmlformats.org/presentationml/2006/main">
+  <p:cSld>
+    <p:spTree>
+      <p:nvGrpSpPr>
+        <p:cNvPr id="1" name=""/>
+        <p:cNvGrpSpPr/>
+        <p:nvPr/>
+      </p:nvGrpSpPr>
+      <p:grpSpPr>
+        <a:xfrm>
+          <a:off x="0" y="0"/>
+          <a:ext cx="0" cy="0"/>
+          <a:chOff x="0" y="0"/>
+          <a:chExt cx="0" cy="0"/>
+        </a:xfrm>
+      </p:grpSpPr>
+      <p:sp>
+        <p:nvSpPr>
+          <p:cNvPr id="2" name="Slide Image Placeholder 1"/>
+          <p:cNvSpPr>
+            <a:spLocks noGrp="1" noRot="1" noChangeAspect="1"/>
+          </p:cNvSpPr>
+          <p:nvPr>
+            <p:ph type="sldImg"/>
+          </p:nvPr>
+        </p:nvSpPr>
+        <p:spPr/>
+      </p:sp>
+      <p:sp>
+        <p:nvSpPr>
+          <p:cNvPr id="3" name="Notes Placeholder 2"/>
+          <p:cNvSpPr>
+            <a:spLocks noGrp="1"/>
+          </p:cNvSpPr>
+          <p:nvPr>
+            <p:ph type="body" idx="1"/>
+          </p:nvPr>
+        </p:nvSpPr>
+        <p:spPr/>
+        <p:txBody>
+          <a:bodyPr/>
+          <a:lstStyle/>
+          <a:p>
+            <a:r>
+              <a:rPr lang="en-US" dirty="0">
+                <a:solidFill>
+                  <a:srgbClr val="FF0000"/>
+                </a:solidFill>
+              </a:rPr>
+              <a:t>Recheck plots</a:t>
+            </a:r>
+          </a:p>
+        </p:txBody>
+      </p:sp>
+      <p:sp>
+        <p:nvSpPr>
+          <p:cNvPr id="4" name="Slide Number Placeholder 3"/>
+          <p:cNvSpPr>
+            <a:spLocks noGrp="1"/>
+          </p:cNvSpPr>
+          <p:nvPr>
+            <p:ph type="sldNum" sz="quarter" idx="5"/>
+          </p:nvPr>
+        </p:nvSpPr>
+        <p:spPr/>
+        <p:txBody>
+          <a:bodyPr/>
+          <a:lstStyle/>
+          <a:p>
+            <a:fld id="{E664AA93-6F0D-5A4C-B7F1-05D840C85487}" type="slidenum">
+              <a:rPr lang="en-US" smtClean="0"/>
+              <a:t>10</a:t>
+            </a:fld>
+            <a:endParaRPr lang="en-US"/>
+          </a:p>
+        </p:txBody>
+      </p:sp>
+    </p:spTree>
+    <p:extLst>
+      <p:ext uri="{BB962C8B-B14F-4D97-AF65-F5344CB8AC3E}">
+        <p14:creationId xmlns:p14="http://schemas.microsoft.com/office/powerpoint/2010/main" val="1608150766"/>
+      </p:ext>
+    </p:extLst>
+  </p:cSld>
+  <p:clrMapOvr>
+    <a:masterClrMapping/>
+  </p:clrMapOvr>
+</p:notes>
+</file>
+
+<file path=ppt/notesSlides/notesSlide7.xml><?xml version="1.0" encoding="utf-8"?>
+<p:notes xmlns:a="http://schemas.openxmlformats.org/drawingml/2006/main" xmlns:r="http://schemas.openxmlformats.org/officeDocument/2006/relationships" xmlns:p="http://schemas.openxmlformats.org/presentationml/2006/main">
+  <p:cSld>
+    <p:spTree>
+      <p:nvGrpSpPr>
+        <p:cNvPr id="1" name=""/>
+        <p:cNvGrpSpPr/>
+        <p:nvPr/>
+      </p:nvGrpSpPr>
+      <p:grpSpPr>
+        <a:xfrm>
+          <a:off x="0" y="0"/>
+          <a:ext cx="0" cy="0"/>
+          <a:chOff x="0" y="0"/>
+          <a:chExt cx="0" cy="0"/>
+        </a:xfrm>
+      </p:grpSpPr>
+      <p:sp>
+        <p:nvSpPr>
+          <p:cNvPr id="2" name="Slide Image Placeholder 1"/>
+          <p:cNvSpPr>
+            <a:spLocks noGrp="1" noRot="1" noChangeAspect="1"/>
+          </p:cNvSpPr>
+          <p:nvPr>
+            <p:ph type="sldImg"/>
+          </p:nvPr>
+        </p:nvSpPr>
+        <p:spPr/>
+      </p:sp>
+      <p:sp>
+        <p:nvSpPr>
+          <p:cNvPr id="3" name="Notes Placeholder 2"/>
+          <p:cNvSpPr>
+            <a:spLocks noGrp="1"/>
+          </p:cNvSpPr>
+          <p:nvPr>
+            <p:ph type="body" idx="1"/>
+          </p:nvPr>
+        </p:nvSpPr>
+        <p:spPr/>
+        <p:txBody>
+          <a:bodyPr/>
+          <a:lstStyle/>
+          <a:p>
+            <a:endParaRPr lang="en-US" dirty="0"/>
+          </a:p>
+        </p:txBody>
+      </p:sp>
+      <p:sp>
+        <p:nvSpPr>
+          <p:cNvPr id="4" name="Slide Number Placeholder 3"/>
+          <p:cNvSpPr>
+            <a:spLocks noGrp="1"/>
+          </p:cNvSpPr>
+          <p:nvPr>
+            <p:ph type="sldNum" sz="quarter" idx="5"/>
+          </p:nvPr>
+        </p:nvSpPr>
+        <p:spPr/>
+        <p:txBody>
+          <a:bodyPr/>
+          <a:lstStyle/>
+          <a:p>
+            <a:fld id="{E664AA93-6F0D-5A4C-B7F1-05D840C85487}" type="slidenum">
+              <a:rPr lang="en-US" smtClean="0"/>
               <a:t>12</a:t>
             </a:fld>
             <a:endParaRPr lang="en-US"/>
@@ -7180,7 +7522,7 @@
 </p:notes>
 </file>
 
-<file path=ppt/notesSlides/notesSlide6.xml><?xml version="1.0" encoding="utf-8"?>
+<file path=ppt/notesSlides/notesSlide8.xml><?xml version="1.0" encoding="utf-8"?>
 <p:notes xmlns:a="http://schemas.openxmlformats.org/drawingml/2006/main" xmlns:r="http://schemas.openxmlformats.org/officeDocument/2006/relationships" xmlns:p="http://schemas.openxmlformats.org/presentationml/2006/main">
   <p:cSld>
     <p:spTree>
@@ -10990,10 +11332,10 @@
       </p:sp>
       <p:pic>
         <p:nvPicPr>
-          <p:cNvPr id="9" name="Picture 8" descr="A close up of a map&#10;&#10;Description automatically generated">
+          <p:cNvPr id="7" name="Picture 6" descr="A close up of a map&#10;&#10;Description automatically generated">
             <a:extLst>
               <a:ext uri="{FF2B5EF4-FFF2-40B4-BE49-F238E27FC236}">
-                <a16:creationId xmlns:a16="http://schemas.microsoft.com/office/drawing/2014/main" id="{22F67FA9-C117-DC44-8775-37020064D2F5}"/>
+                <a16:creationId xmlns:a16="http://schemas.microsoft.com/office/drawing/2014/main" id="{97052A13-803C-CF4F-87B8-229F87CE6224}"/>
               </a:ext>
             </a:extLst>
           </p:cNvPr>
@@ -11010,8 +11352,8 @@
         </p:blipFill>
         <p:spPr>
           <a:xfrm>
-            <a:off x="6201653" y="1452774"/>
-            <a:ext cx="5290457" cy="4114800"/>
+            <a:off x="3661134" y="1835751"/>
+            <a:ext cx="5172892" cy="4023360"/>
           </a:xfrm>
           <a:prstGeom prst="rect">
             <a:avLst/>
@@ -11020,10 +11362,10 @@
       </p:pic>
       <p:pic>
         <p:nvPicPr>
-          <p:cNvPr id="11" name="Picture 10" descr="A screenshot of a cell phone&#10;&#10;Description automatically generated">
+          <p:cNvPr id="10" name="Picture 9" descr="A screenshot of a cell phone&#10;&#10;Description automatically generated">
             <a:extLst>
               <a:ext uri="{FF2B5EF4-FFF2-40B4-BE49-F238E27FC236}">
-                <a16:creationId xmlns:a16="http://schemas.microsoft.com/office/drawing/2014/main" id="{F75DB027-FE91-0D4C-9705-9D0F9D2C7812}"/>
+                <a16:creationId xmlns:a16="http://schemas.microsoft.com/office/drawing/2014/main" id="{890AA115-7BA5-5F4B-A59E-97E71D5132A5}"/>
               </a:ext>
             </a:extLst>
           </p:cNvPr>
@@ -11040,8 +11382,38 @@
         </p:blipFill>
         <p:spPr>
           <a:xfrm>
-            <a:off x="699892" y="1452774"/>
-            <a:ext cx="5290457" cy="4114800"/>
+            <a:off x="3661134" y="1835751"/>
+            <a:ext cx="5172892" cy="4023360"/>
+          </a:xfrm>
+          <a:prstGeom prst="rect">
+            <a:avLst/>
+          </a:prstGeom>
+        </p:spPr>
+      </p:pic>
+      <p:pic>
+        <p:nvPicPr>
+          <p:cNvPr id="13" name="Picture 12" descr="A close up of a map&#10;&#10;Description automatically generated">
+            <a:extLst>
+              <a:ext uri="{FF2B5EF4-FFF2-40B4-BE49-F238E27FC236}">
+                <a16:creationId xmlns:a16="http://schemas.microsoft.com/office/drawing/2014/main" id="{E2DD5719-FC58-B641-981F-046F9C300CAB}"/>
+              </a:ext>
+            </a:extLst>
+          </p:cNvPr>
+          <p:cNvPicPr>
+            <a:picLocks noChangeAspect="1"/>
+          </p:cNvPicPr>
+          <p:nvPr/>
+        </p:nvPicPr>
+        <p:blipFill>
+          <a:blip r:embed="rId5"/>
+          <a:stretch>
+            <a:fillRect/>
+          </a:stretch>
+        </p:blipFill>
+        <p:spPr>
+          <a:xfrm>
+            <a:off x="3661134" y="1835751"/>
+            <a:ext cx="5172892" cy="4023360"/>
           </a:xfrm>
           <a:prstGeom prst="rect">
             <a:avLst/>
@@ -11058,6 +11430,126 @@
   <p:clrMapOvr>
     <a:masterClrMapping/>
   </p:clrMapOvr>
+  <p:timing>
+    <p:tnLst>
+      <p:par>
+        <p:cTn id="1" dur="indefinite" restart="never" nodeType="tmRoot">
+          <p:childTnLst>
+            <p:seq concurrent="1" nextAc="seek">
+              <p:cTn id="2" dur="indefinite" nodeType="mainSeq">
+                <p:childTnLst>
+                  <p:par>
+                    <p:cTn id="3" fill="hold">
+                      <p:stCondLst>
+                        <p:cond delay="indefinite"/>
+                      </p:stCondLst>
+                      <p:childTnLst>
+                        <p:par>
+                          <p:cTn id="4" fill="hold">
+                            <p:stCondLst>
+                              <p:cond delay="0"/>
+                            </p:stCondLst>
+                            <p:childTnLst>
+                              <p:par>
+                                <p:cTn id="5" presetID="1" presetClass="entr" presetSubtype="0" fill="hold" nodeType="clickEffect">
+                                  <p:stCondLst>
+                                    <p:cond delay="0"/>
+                                  </p:stCondLst>
+                                  <p:childTnLst>
+                                    <p:set>
+                                      <p:cBhvr>
+                                        <p:cTn id="6" dur="1" fill="hold">
+                                          <p:stCondLst>
+                                            <p:cond delay="0"/>
+                                          </p:stCondLst>
+                                        </p:cTn>
+                                        <p:tgtEl>
+                                          <p:spTgt spid="10"/>
+                                        </p:tgtEl>
+                                        <p:attrNameLst>
+                                          <p:attrName>style.visibility</p:attrName>
+                                        </p:attrNameLst>
+                                      </p:cBhvr>
+                                      <p:to>
+                                        <p:strVal val="visible"/>
+                                      </p:to>
+                                    </p:set>
+                                  </p:childTnLst>
+                                </p:cTn>
+                              </p:par>
+                            </p:childTnLst>
+                          </p:cTn>
+                        </p:par>
+                      </p:childTnLst>
+                    </p:cTn>
+                  </p:par>
+                  <p:par>
+                    <p:cTn id="7" fill="hold">
+                      <p:stCondLst>
+                        <p:cond delay="indefinite"/>
+                      </p:stCondLst>
+                      <p:childTnLst>
+                        <p:par>
+                          <p:cTn id="8" fill="hold">
+                            <p:stCondLst>
+                              <p:cond delay="0"/>
+                            </p:stCondLst>
+                            <p:childTnLst>
+                              <p:par>
+                                <p:cTn id="9" presetID="1" presetClass="entr" presetSubtype="0" fill="hold" nodeType="clickEffect">
+                                  <p:stCondLst>
+                                    <p:cond delay="0"/>
+                                  </p:stCondLst>
+                                  <p:childTnLst>
+                                    <p:set>
+                                      <p:cBhvr>
+                                        <p:cTn id="10" dur="1" fill="hold">
+                                          <p:stCondLst>
+                                            <p:cond delay="0"/>
+                                          </p:stCondLst>
+                                        </p:cTn>
+                                        <p:tgtEl>
+                                          <p:spTgt spid="13"/>
+                                        </p:tgtEl>
+                                        <p:attrNameLst>
+                                          <p:attrName>style.visibility</p:attrName>
+                                        </p:attrNameLst>
+                                      </p:cBhvr>
+                                      <p:to>
+                                        <p:strVal val="visible"/>
+                                      </p:to>
+                                    </p:set>
+                                  </p:childTnLst>
+                                </p:cTn>
+                              </p:par>
+                            </p:childTnLst>
+                          </p:cTn>
+                        </p:par>
+                      </p:childTnLst>
+                    </p:cTn>
+                  </p:par>
+                </p:childTnLst>
+              </p:cTn>
+              <p:prevCondLst>
+                <p:cond evt="onPrev" delay="0">
+                  <p:tgtEl>
+                    <p:sldTgt/>
+                  </p:tgtEl>
+                </p:cond>
+              </p:prevCondLst>
+              <p:nextCondLst>
+                <p:cond evt="onNext" delay="0">
+                  <p:tgtEl>
+                    <p:sldTgt/>
+                  </p:tgtEl>
+                </p:cond>
+              </p:nextCondLst>
+            </p:seq>
+          </p:childTnLst>
+        </p:cTn>
+      </p:par>
+    </p:tnLst>
+  </p:timing>
 </p:sld>
 </file>
 
@@ -12063,7 +12555,7 @@
         </p:nvSpPr>
         <p:spPr>
           <a:xfrm>
-            <a:off x="0" y="30139"/>
+            <a:off x="117973" y="18426"/>
             <a:ext cx="10515600" cy="1325563"/>
           </a:xfrm>
         </p:spPr>
@@ -13040,6 +13532,15 @@
           </a:p>
           <a:p>
             <a:r>
+              <a:rPr lang="en-US" dirty="0"/>
+              <a:t>Murray Lab!</a:t>
+            </a:r>
+          </a:p>
+          <a:p>
+            <a:endParaRPr lang="en-US" dirty="0"/>
+          </a:p>
+          <a:p>
+            <a:r>
               <a:rPr lang="en-US" dirty="0">
                 <a:ea typeface="Cambria Math" panose="02040503050406030204" pitchFamily="18" charset="0"/>
               </a:rPr>
@@ -13162,7 +13663,7 @@
         </p:nvGrpSpPr>
         <p:grpSpPr>
           <a:xfrm>
-            <a:off x="6774911" y="4001294"/>
+            <a:off x="8931883" y="0"/>
             <a:ext cx="3253274" cy="2056656"/>
             <a:chOff x="2673543" y="2305946"/>
             <a:chExt cx="6358945" cy="3897417"/>
@@ -14250,7 +14751,7 @@
           <a:p>
             <a:r>
               <a:rPr lang="en-US" sz="3200" dirty="0"/>
-              <a:t>What are synthetic cells?</a:t>
+              <a:t>Motivation</a:t>
             </a:r>
           </a:p>
         </p:txBody>
@@ -16041,7 +16542,7 @@
           <p:cNvPr id="2" name="Title 1">
             <a:extLst>
               <a:ext uri="{FF2B5EF4-FFF2-40B4-BE49-F238E27FC236}">
-                <a16:creationId xmlns:a16="http://schemas.microsoft.com/office/drawing/2014/main" id="{3D6E3E7D-EA17-B04F-91AA-F791E5FEA069}"/>
+                <a16:creationId xmlns:a16="http://schemas.microsoft.com/office/drawing/2014/main" id="{0F284A7B-62E5-B749-B50A-81A4852C3193}"/>
               </a:ext>
             </a:extLst>
           </p:cNvPr>
@@ -16054,7 +16555,7 @@
         </p:nvSpPr>
         <p:spPr>
           <a:xfrm>
-            <a:off x="330778" y="5930"/>
+            <a:off x="751033" y="381914"/>
             <a:ext cx="10515600" cy="1325563"/>
           </a:xfrm>
         </p:spPr>
@@ -16065,9 +16566,10 @@
           <a:lstStyle/>
           <a:p>
             <a:r>
-              <a:rPr lang="en-US" sz="3200" dirty="0"/>
-              <a:t>Software Tools</a:t>
+              <a:rPr lang="en-US" sz="3200"/>
+              <a:t>Software Workflow</a:t>
             </a:r>
+            <a:endParaRPr lang="en-US" sz="3200" dirty="0"/>
           </a:p>
         </p:txBody>
       </p:sp>
@@ -16076,7 +16578,7 @@
           <p:cNvPr id="3" name="Date Placeholder 2">
             <a:extLst>
               <a:ext uri="{FF2B5EF4-FFF2-40B4-BE49-F238E27FC236}">
-                <a16:creationId xmlns:a16="http://schemas.microsoft.com/office/drawing/2014/main" id="{A3E00202-AE59-3441-A4EC-D70D1FFCB475}"/>
+                <a16:creationId xmlns:a16="http://schemas.microsoft.com/office/drawing/2014/main" id="{A54CA2FE-267F-3848-9595-4A38424CB444}"/>
               </a:ext>
             </a:extLst>
           </p:cNvPr>
@@ -16104,7 +16606,7 @@
           <p:cNvPr id="4" name="Footer Placeholder 3">
             <a:extLst>
               <a:ext uri="{FF2B5EF4-FFF2-40B4-BE49-F238E27FC236}">
-                <a16:creationId xmlns:a16="http://schemas.microsoft.com/office/drawing/2014/main" id="{AA4AC2F8-66EC-0748-B17F-2AF994CF5402}"/>
+                <a16:creationId xmlns:a16="http://schemas.microsoft.com/office/drawing/2014/main" id="{57025824-CC1F-A04E-983C-C22D55DEBECC}"/>
               </a:ext>
             </a:extLst>
           </p:cNvPr>
@@ -16132,7 +16634,7 @@
           <p:cNvPr id="5" name="Slide Number Placeholder 4">
             <a:extLst>
               <a:ext uri="{FF2B5EF4-FFF2-40B4-BE49-F238E27FC236}">
-                <a16:creationId xmlns:a16="http://schemas.microsoft.com/office/drawing/2014/main" id="{9B1E38FF-045F-8640-B0D0-16D8FA5D5CCA}"/>
+                <a16:creationId xmlns:a16="http://schemas.microsoft.com/office/drawing/2014/main" id="{49245131-B9F0-CE40-A0D4-3B3460F256A0}"/>
               </a:ext>
             </a:extLst>
           </p:cNvPr>
@@ -16156,491 +16658,527 @@
           </a:p>
         </p:txBody>
       </p:sp>
-      <p:pic>
-        <p:nvPicPr>
-          <p:cNvPr id="6" name="Google Shape;62;p14">
+      <p:grpSp>
+        <p:nvGrpSpPr>
+          <p:cNvPr id="6" name="Group 5">
             <a:extLst>
               <a:ext uri="{FF2B5EF4-FFF2-40B4-BE49-F238E27FC236}">
-                <a16:creationId xmlns:a16="http://schemas.microsoft.com/office/drawing/2014/main" id="{01E7C269-2877-1046-8339-4112AC83AC28}"/>
+                <a16:creationId xmlns:a16="http://schemas.microsoft.com/office/drawing/2014/main" id="{AE3CCAE6-F3C5-5C40-B06A-0555F68C102A}"/>
               </a:ext>
             </a:extLst>
           </p:cNvPr>
-          <p:cNvPicPr preferRelativeResize="0"/>
+          <p:cNvGrpSpPr/>
           <p:nvPr/>
-        </p:nvPicPr>
-        <p:blipFill>
-          <a:blip r:embed="rId2">
-            <a:alphaModFix/>
-          </a:blip>
-          <a:stretch>
-            <a:fillRect/>
-          </a:stretch>
-        </p:blipFill>
-        <p:spPr>
+        </p:nvGrpSpPr>
+        <p:grpSpPr>
           <a:xfrm>
-            <a:off x="1270645" y="2952744"/>
-            <a:ext cx="3560801" cy="619540"/>
+            <a:off x="1020854" y="2127700"/>
+            <a:ext cx="9617472" cy="2814717"/>
+            <a:chOff x="14264640" y="12623798"/>
+            <a:chExt cx="9617472" cy="2814717"/>
           </a:xfrm>
-          <a:prstGeom prst="rect">
-            <a:avLst/>
-          </a:prstGeom>
-          <a:noFill/>
-          <a:ln>
-            <a:noFill/>
-          </a:ln>
-        </p:spPr>
-      </p:pic>
-      <p:sp>
-        <p:nvSpPr>
-          <p:cNvPr id="7" name="Google Shape;63;p14">
-            <a:extLst>
-              <a:ext uri="{FF2B5EF4-FFF2-40B4-BE49-F238E27FC236}">
-                <a16:creationId xmlns:a16="http://schemas.microsoft.com/office/drawing/2014/main" id="{906D4A3B-8C32-1C41-B211-5BE9DF81AF30}"/>
-              </a:ext>
-            </a:extLst>
-          </p:cNvPr>
-          <p:cNvSpPr/>
-          <p:nvPr/>
-        </p:nvSpPr>
-        <p:spPr>
-          <a:xfrm>
-            <a:off x="5243677" y="1813578"/>
-            <a:ext cx="2662000" cy="333200"/>
-          </a:xfrm>
-          <a:prstGeom prst="rightArrow">
-            <a:avLst>
-              <a:gd name="adj1" fmla="val 50000"/>
-              <a:gd name="adj2" fmla="val 50000"/>
-            </a:avLst>
-          </a:prstGeom>
-          <a:solidFill>
-            <a:schemeClr val="lt2"/>
-          </a:solidFill>
-          <a:ln w="9525" cap="flat" cmpd="sng">
+        </p:grpSpPr>
+        <p:sp>
+          <p:nvSpPr>
+            <p:cNvPr id="7" name="Rounded Rectangle 6">
+              <a:extLst>
+                <a:ext uri="{FF2B5EF4-FFF2-40B4-BE49-F238E27FC236}">
+                  <a16:creationId xmlns:a16="http://schemas.microsoft.com/office/drawing/2014/main" id="{0704614A-7BA2-0246-A967-01D88BB722DB}"/>
+                </a:ext>
+              </a:extLst>
+            </p:cNvPr>
+            <p:cNvSpPr/>
+            <p:nvPr/>
+          </p:nvSpPr>
+          <p:spPr>
+            <a:xfrm>
+              <a:off x="14264640" y="12649200"/>
+              <a:ext cx="2575560" cy="914400"/>
+            </a:xfrm>
+            <a:prstGeom prst="roundRect">
+              <a:avLst/>
+            </a:prstGeom>
             <a:solidFill>
-              <a:schemeClr val="dk2"/>
+              <a:schemeClr val="accent2">
+                <a:lumMod val="40000"/>
+                <a:lumOff val="60000"/>
+              </a:schemeClr>
             </a:solidFill>
-            <a:prstDash val="solid"/>
-            <a:round/>
-            <a:headEnd type="none" w="sm" len="sm"/>
-            <a:tailEnd type="none" w="sm" len="sm"/>
-          </a:ln>
-        </p:spPr>
-        <p:txBody>
-          <a:bodyPr spcFirstLastPara="1" wrap="square" lIns="121900" tIns="121900" rIns="121900" bIns="121900" anchor="ctr" anchorCtr="0">
-            <a:noAutofit/>
-          </a:bodyPr>
-          <a:lstStyle/>
-          <a:p>
-            <a:endParaRPr sz="2400"/>
-          </a:p>
-        </p:txBody>
-      </p:sp>
-      <p:sp>
-        <p:nvSpPr>
-          <p:cNvPr id="8" name="Google Shape;65;p14">
-            <a:extLst>
-              <a:ext uri="{FF2B5EF4-FFF2-40B4-BE49-F238E27FC236}">
-                <a16:creationId xmlns:a16="http://schemas.microsoft.com/office/drawing/2014/main" id="{7DC617CB-92AA-E945-A8E7-E3F0125FBEE2}"/>
-              </a:ext>
-            </a:extLst>
-          </p:cNvPr>
-          <p:cNvSpPr/>
-          <p:nvPr/>
-        </p:nvSpPr>
-        <p:spPr>
-          <a:xfrm>
-            <a:off x="5243677" y="3345578"/>
-            <a:ext cx="2662000" cy="333200"/>
-          </a:xfrm>
-          <a:prstGeom prst="rightArrow">
-            <a:avLst>
-              <a:gd name="adj1" fmla="val 50000"/>
-              <a:gd name="adj2" fmla="val 50000"/>
-            </a:avLst>
-          </a:prstGeom>
-          <a:solidFill>
-            <a:schemeClr val="lt2"/>
-          </a:solidFill>
-          <a:ln w="9525" cap="flat" cmpd="sng">
+          </p:spPr>
+          <p:style>
+            <a:lnRef idx="2">
+              <a:schemeClr val="accent1">
+                <a:shade val="50000"/>
+              </a:schemeClr>
+            </a:lnRef>
+            <a:fillRef idx="1">
+              <a:schemeClr val="accent1"/>
+            </a:fillRef>
+            <a:effectRef idx="0">
+              <a:schemeClr val="accent1"/>
+            </a:effectRef>
+            <a:fontRef idx="minor">
+              <a:schemeClr val="lt1"/>
+            </a:fontRef>
+          </p:style>
+          <p:txBody>
+            <a:bodyPr rtlCol="0" anchor="ctr"/>
+            <a:lstStyle/>
+            <a:p>
+              <a:pPr algn="ctr"/>
+              <a:r>
+                <a:rPr lang="en-US" sz="2800" dirty="0">
+                  <a:solidFill>
+                    <a:schemeClr val="tx1"/>
+                  </a:solidFill>
+                  <a:latin typeface="Avenir Book" panose="02000503020000020003" pitchFamily="2" charset="0"/>
+                </a:rPr>
+                <a:t>Design Model</a:t>
+              </a:r>
+            </a:p>
+          </p:txBody>
+        </p:sp>
+        <p:sp>
+          <p:nvSpPr>
+            <p:cNvPr id="8" name="Right Arrow 7">
+              <a:extLst>
+                <a:ext uri="{FF2B5EF4-FFF2-40B4-BE49-F238E27FC236}">
+                  <a16:creationId xmlns:a16="http://schemas.microsoft.com/office/drawing/2014/main" id="{B0CF95E0-74D7-7F4C-AB97-3EA61C7232C3}"/>
+                </a:ext>
+              </a:extLst>
+            </p:cNvPr>
+            <p:cNvSpPr/>
+            <p:nvPr/>
+          </p:nvSpPr>
+          <p:spPr>
+            <a:xfrm>
+              <a:off x="16900427" y="12984617"/>
+              <a:ext cx="762733" cy="193259"/>
+            </a:xfrm>
+            <a:prstGeom prst="rightArrow">
+              <a:avLst/>
+            </a:prstGeom>
             <a:solidFill>
-              <a:schemeClr val="dk2"/>
+              <a:schemeClr val="accent2">
+                <a:lumMod val="40000"/>
+                <a:lumOff val="60000"/>
+              </a:schemeClr>
             </a:solidFill>
-            <a:prstDash val="solid"/>
-            <a:round/>
-            <a:headEnd type="none" w="sm" len="sm"/>
-            <a:tailEnd type="none" w="sm" len="sm"/>
-          </a:ln>
-        </p:spPr>
-        <p:txBody>
-          <a:bodyPr spcFirstLastPara="1" wrap="square" lIns="121900" tIns="121900" rIns="121900" bIns="121900" anchor="ctr" anchorCtr="0">
-            <a:noAutofit/>
-          </a:bodyPr>
-          <a:lstStyle/>
-          <a:p>
-            <a:endParaRPr sz="2400"/>
-          </a:p>
-        </p:txBody>
-      </p:sp>
-      <p:pic>
-        <p:nvPicPr>
-          <p:cNvPr id="9" name="Google Shape;67;p14">
-            <a:extLst>
-              <a:ext uri="{FF2B5EF4-FFF2-40B4-BE49-F238E27FC236}">
-                <a16:creationId xmlns:a16="http://schemas.microsoft.com/office/drawing/2014/main" id="{5F19FA73-3E97-8640-8398-AEE5516AFE22}"/>
-              </a:ext>
-            </a:extLst>
-          </p:cNvPr>
-          <p:cNvPicPr preferRelativeResize="0"/>
-          <p:nvPr/>
-        </p:nvPicPr>
-        <p:blipFill>
-          <a:blip r:embed="rId3">
-            <a:alphaModFix/>
-          </a:blip>
-          <a:stretch>
-            <a:fillRect/>
-          </a:stretch>
-        </p:blipFill>
-        <p:spPr>
-          <a:xfrm>
-            <a:off x="1270644" y="1401412"/>
-            <a:ext cx="3880200" cy="1157536"/>
-          </a:xfrm>
-          <a:prstGeom prst="rect">
-            <a:avLst/>
-          </a:prstGeom>
-          <a:noFill/>
-          <a:ln>
-            <a:noFill/>
-          </a:ln>
-        </p:spPr>
-      </p:pic>
-      <p:sp>
-        <p:nvSpPr>
-          <p:cNvPr id="10" name="Google Shape;70;p14">
-            <a:extLst>
-              <a:ext uri="{FF2B5EF4-FFF2-40B4-BE49-F238E27FC236}">
-                <a16:creationId xmlns:a16="http://schemas.microsoft.com/office/drawing/2014/main" id="{45ADD4F1-1B94-CC47-A63C-2F98B83B4FA1}"/>
-              </a:ext>
-            </a:extLst>
-          </p:cNvPr>
-          <p:cNvSpPr/>
-          <p:nvPr/>
-        </p:nvSpPr>
-        <p:spPr>
-          <a:xfrm>
-            <a:off x="1966010" y="4992078"/>
-            <a:ext cx="1850000" cy="1157600"/>
-          </a:xfrm>
-          <a:prstGeom prst="roundRect">
-            <a:avLst>
-              <a:gd name="adj" fmla="val 16667"/>
-            </a:avLst>
-          </a:prstGeom>
-          <a:solidFill>
-            <a:schemeClr val="lt2"/>
-          </a:solidFill>
-          <a:ln w="9525" cap="flat" cmpd="sng">
-            <a:solidFill>
-              <a:schemeClr val="dk2"/>
-            </a:solidFill>
-            <a:prstDash val="solid"/>
-            <a:round/>
-            <a:headEnd type="none" w="sm" len="sm"/>
-            <a:tailEnd type="none" w="sm" len="sm"/>
-          </a:ln>
-        </p:spPr>
-        <p:txBody>
-          <a:bodyPr spcFirstLastPara="1" wrap="square" lIns="121900" tIns="121900" rIns="121900" bIns="121900" anchor="ctr" anchorCtr="0">
-            <a:noAutofit/>
-          </a:bodyPr>
-          <a:lstStyle/>
-          <a:p>
-            <a:r>
-              <a:rPr lang="en" sz="2267" dirty="0">
-                <a:latin typeface="Avenir Book" panose="02000503020000020003" pitchFamily="2" charset="0"/>
-              </a:rPr>
-              <a:t>Bioscrape</a:t>
-            </a:r>
-            <a:endParaRPr sz="2267" dirty="0">
-              <a:latin typeface="Avenir Book" panose="02000503020000020003" pitchFamily="2" charset="0"/>
-            </a:endParaRPr>
-          </a:p>
-        </p:txBody>
-      </p:sp>
-      <p:sp>
-        <p:nvSpPr>
-          <p:cNvPr id="11" name="Google Shape;71;p14">
-            <a:extLst>
-              <a:ext uri="{FF2B5EF4-FFF2-40B4-BE49-F238E27FC236}">
-                <a16:creationId xmlns:a16="http://schemas.microsoft.com/office/drawing/2014/main" id="{1B8A0E23-74A2-DA46-B3EE-587B4135C559}"/>
-              </a:ext>
-            </a:extLst>
-          </p:cNvPr>
-          <p:cNvSpPr/>
-          <p:nvPr/>
-        </p:nvSpPr>
-        <p:spPr>
-          <a:xfrm>
-            <a:off x="5150844" y="5300029"/>
-            <a:ext cx="2662000" cy="333200"/>
-          </a:xfrm>
-          <a:prstGeom prst="rightArrow">
-            <a:avLst>
-              <a:gd name="adj1" fmla="val 50000"/>
-              <a:gd name="adj2" fmla="val 50000"/>
-            </a:avLst>
-          </a:prstGeom>
-          <a:solidFill>
-            <a:schemeClr val="lt2"/>
-          </a:solidFill>
-          <a:ln w="9525" cap="flat" cmpd="sng">
-            <a:solidFill>
-              <a:schemeClr val="dk2"/>
-            </a:solidFill>
-            <a:prstDash val="solid"/>
-            <a:round/>
-            <a:headEnd type="none" w="sm" len="sm"/>
-            <a:tailEnd type="none" w="sm" len="sm"/>
-          </a:ln>
-        </p:spPr>
-        <p:txBody>
-          <a:bodyPr spcFirstLastPara="1" wrap="square" lIns="121900" tIns="121900" rIns="121900" bIns="121900" anchor="ctr" anchorCtr="0">
-            <a:noAutofit/>
-          </a:bodyPr>
-          <a:lstStyle/>
-          <a:p>
-            <a:endParaRPr sz="2400"/>
-          </a:p>
-        </p:txBody>
-      </p:sp>
-      <p:pic>
-        <p:nvPicPr>
-          <p:cNvPr id="12" name="Google Shape;74;p14">
-            <a:extLst>
-              <a:ext uri="{FF2B5EF4-FFF2-40B4-BE49-F238E27FC236}">
-                <a16:creationId xmlns:a16="http://schemas.microsoft.com/office/drawing/2014/main" id="{06EC7C7E-AE25-6941-B94A-C95DFDCD589A}"/>
-              </a:ext>
-            </a:extLst>
-          </p:cNvPr>
-          <p:cNvPicPr preferRelativeResize="0"/>
-          <p:nvPr/>
-        </p:nvPicPr>
-        <p:blipFill rotWithShape="1">
-          <a:blip r:embed="rId4">
-            <a:alphaModFix/>
-          </a:blip>
-          <a:srcRect l="24672" t="78889" r="63435" b="12795"/>
-          <a:stretch/>
-        </p:blipFill>
-        <p:spPr>
-          <a:xfrm>
-            <a:off x="2084294" y="3688012"/>
-            <a:ext cx="1613433" cy="683599"/>
-          </a:xfrm>
-          <a:prstGeom prst="rect">
-            <a:avLst/>
-          </a:prstGeom>
-          <a:noFill/>
-          <a:ln>
-            <a:noFill/>
-          </a:ln>
-        </p:spPr>
-      </p:pic>
-      <p:sp>
-        <p:nvSpPr>
-          <p:cNvPr id="13" name="Google Shape;66;p14">
-            <a:extLst>
-              <a:ext uri="{FF2B5EF4-FFF2-40B4-BE49-F238E27FC236}">
-                <a16:creationId xmlns:a16="http://schemas.microsoft.com/office/drawing/2014/main" id="{96C33076-5D56-F443-9877-34C85A46EA4B}"/>
-              </a:ext>
-            </a:extLst>
-          </p:cNvPr>
-          <p:cNvSpPr txBox="1">
-            <a:spLocks/>
-          </p:cNvSpPr>
-          <p:nvPr/>
-        </p:nvSpPr>
-        <p:spPr>
-          <a:xfrm>
-            <a:off x="8253116" y="3297425"/>
-            <a:ext cx="3560762" cy="852488"/>
-          </a:xfrm>
-          <a:prstGeom prst="rect">
-            <a:avLst/>
-          </a:prstGeom>
-        </p:spPr>
-        <p:txBody>
-          <a:bodyPr spcFirstLastPara="1" vert="horz" wrap="square" lIns="121900" tIns="121900" rIns="121900" bIns="121900" rtlCol="0" anchor="t" anchorCtr="0">
-            <a:noAutofit/>
-          </a:bodyPr>
-          <a:lstStyle>
-            <a:lvl1pPr algn="l" defTabSz="914400" rtl="0" eaLnBrk="1" latinLnBrk="0" hangingPunct="1">
-              <a:lnSpc>
-                <a:spcPct val="90000"/>
-              </a:lnSpc>
-              <a:spcBef>
-                <a:spcPct val="0"/>
-              </a:spcBef>
-              <a:buNone/>
-              <a:defRPr sz="4400" kern="1200">
+          </p:spPr>
+          <p:style>
+            <a:lnRef idx="2">
+              <a:schemeClr val="accent1">
+                <a:shade val="50000"/>
+              </a:schemeClr>
+            </a:lnRef>
+            <a:fillRef idx="1">
+              <a:schemeClr val="accent1"/>
+            </a:fillRef>
+            <a:effectRef idx="0">
+              <a:schemeClr val="accent1"/>
+            </a:effectRef>
+            <a:fontRef idx="minor">
+              <a:schemeClr val="lt1"/>
+            </a:fontRef>
+          </p:style>
+          <p:txBody>
+            <a:bodyPr rtlCol="0" anchor="ctr"/>
+            <a:lstStyle/>
+            <a:p>
+              <a:pPr algn="ctr"/>
+              <a:endParaRPr lang="en-US" dirty="0">
                 <a:solidFill>
                   <a:schemeClr val="tx1"/>
                 </a:solidFill>
-                <a:latin typeface="Avenir Book" panose="02000503020000020003" pitchFamily="2" charset="0"/>
-                <a:ea typeface="+mj-ea"/>
-                <a:cs typeface="+mj-cs"/>
-              </a:defRPr>
-            </a:lvl1pPr>
-          </a:lstStyle>
-          <a:p>
-            <a:r>
-              <a:rPr lang="en-US" sz="2000">
-                <a:solidFill>
-                  <a:srgbClr val="434343"/>
-                </a:solidFill>
-              </a:rPr>
-              <a:t>Communicate &amp; Combine!</a:t>
-            </a:r>
-            <a:endParaRPr lang="en-US" sz="2000">
-              <a:solidFill>
-                <a:srgbClr val="FF0000"/>
-              </a:solidFill>
-            </a:endParaRPr>
-          </a:p>
-        </p:txBody>
-      </p:sp>
-      <p:sp>
-        <p:nvSpPr>
-          <p:cNvPr id="14" name="Google Shape;72;p14">
+              </a:endParaRPr>
+            </a:p>
+          </p:txBody>
+        </p:sp>
+        <p:pic>
+          <p:nvPicPr>
+            <p:cNvPr id="9" name="Picture 9">
+              <a:extLst>
+                <a:ext uri="{FF2B5EF4-FFF2-40B4-BE49-F238E27FC236}">
+                  <a16:creationId xmlns:a16="http://schemas.microsoft.com/office/drawing/2014/main" id="{8A59FB75-A1A8-F14F-8DDF-D7DC3916B24F}"/>
+                </a:ext>
+              </a:extLst>
+            </p:cNvPr>
+            <p:cNvPicPr>
+              <a:picLocks noChangeAspect="1" noChangeArrowheads="1"/>
+            </p:cNvPicPr>
+            <p:nvPr/>
+          </p:nvPicPr>
+          <p:blipFill>
+            <a:blip r:embed="rId3">
+              <a:extLst>
+                <a:ext uri="{28A0092B-C50C-407E-A947-70E740481C1C}">
+                  <a14:useLocalDpi xmlns:a14="http://schemas.microsoft.com/office/drawing/2010/main" val="0"/>
+                </a:ext>
+              </a:extLst>
+            </a:blip>
+            <a:srcRect/>
+            <a:stretch>
+              <a:fillRect/>
+            </a:stretch>
+          </p:blipFill>
+          <p:spPr bwMode="auto">
+            <a:xfrm>
+              <a:off x="17766135" y="12623798"/>
+              <a:ext cx="3235459" cy="965200"/>
+            </a:xfrm>
+            <a:prstGeom prst="rect">
+              <a:avLst/>
+            </a:prstGeom>
+            <a:noFill/>
             <a:extLst>
-              <a:ext uri="{FF2B5EF4-FFF2-40B4-BE49-F238E27FC236}">
-                <a16:creationId xmlns:a16="http://schemas.microsoft.com/office/drawing/2014/main" id="{08D2AC42-68F3-E447-BD9B-1C1FA2225141}"/>
+              <a:ext uri="{909E8E84-426E-40DD-AFC4-6F175D3DCCD1}">
+                <a14:hiddenFill xmlns:a14="http://schemas.microsoft.com/office/drawing/2010/main">
+                  <a:solidFill>
+                    <a:srgbClr val="FFFFFF"/>
+                  </a:solidFill>
+                </a14:hiddenFill>
               </a:ext>
             </a:extLst>
-          </p:cNvPr>
-          <p:cNvSpPr txBox="1">
-            <a:spLocks/>
-          </p:cNvSpPr>
-          <p:nvPr/>
-        </p:nvSpPr>
-        <p:spPr>
-          <a:xfrm>
-            <a:off x="8253116" y="5251638"/>
-            <a:ext cx="3560762" cy="852487"/>
-          </a:xfrm>
-          <a:prstGeom prst="rect">
-            <a:avLst/>
-          </a:prstGeom>
-        </p:spPr>
-        <p:txBody>
-          <a:bodyPr spcFirstLastPara="1" vert="horz" wrap="square" lIns="121900" tIns="121900" rIns="121900" bIns="121900" rtlCol="0" anchor="t" anchorCtr="0">
-            <a:noAutofit/>
-          </a:bodyPr>
-          <a:lstStyle>
-            <a:lvl1pPr algn="l" defTabSz="914400" rtl="0" eaLnBrk="1" latinLnBrk="0" hangingPunct="1">
-              <a:lnSpc>
-                <a:spcPct val="90000"/>
-              </a:lnSpc>
-              <a:spcBef>
-                <a:spcPct val="0"/>
-              </a:spcBef>
-              <a:buNone/>
-              <a:defRPr sz="4400" kern="1200">
+          </p:spPr>
+        </p:pic>
+        <p:pic>
+          <p:nvPicPr>
+            <p:cNvPr id="10" name="Picture 13">
+              <a:extLst>
+                <a:ext uri="{FF2B5EF4-FFF2-40B4-BE49-F238E27FC236}">
+                  <a16:creationId xmlns:a16="http://schemas.microsoft.com/office/drawing/2014/main" id="{23C2AC74-AEF2-EB42-9CE3-EB6CA99F6F8F}"/>
+                </a:ext>
+              </a:extLst>
+            </p:cNvPr>
+            <p:cNvPicPr>
+              <a:picLocks noChangeAspect="1" noChangeArrowheads="1"/>
+            </p:cNvPicPr>
+            <p:nvPr/>
+          </p:nvPicPr>
+          <p:blipFill rotWithShape="1">
+            <a:blip r:embed="rId4">
+              <a:extLst>
+                <a:ext uri="{28A0092B-C50C-407E-A947-70E740481C1C}">
+                  <a14:useLocalDpi xmlns:a14="http://schemas.microsoft.com/office/drawing/2010/main" val="0"/>
+                </a:ext>
+              </a:extLst>
+            </a:blip>
+            <a:srcRect r="62162"/>
+            <a:stretch/>
+          </p:blipFill>
+          <p:spPr bwMode="auto">
+            <a:xfrm>
+              <a:off x="21978123" y="12668651"/>
+              <a:ext cx="1903989" cy="875495"/>
+            </a:xfrm>
+            <a:prstGeom prst="rect">
+              <a:avLst/>
+            </a:prstGeom>
+            <a:noFill/>
+            <a:extLst>
+              <a:ext uri="{909E8E84-426E-40DD-AFC4-6F175D3DCCD1}">
+                <a14:hiddenFill xmlns:a14="http://schemas.microsoft.com/office/drawing/2010/main">
+                  <a:solidFill>
+                    <a:srgbClr val="FFFFFF"/>
+                  </a:solidFill>
+                </a14:hiddenFill>
+              </a:ext>
+            </a:extLst>
+          </p:spPr>
+        </p:pic>
+        <p:sp>
+          <p:nvSpPr>
+            <p:cNvPr id="11" name="Right Arrow 10">
+              <a:extLst>
+                <a:ext uri="{FF2B5EF4-FFF2-40B4-BE49-F238E27FC236}">
+                  <a16:creationId xmlns:a16="http://schemas.microsoft.com/office/drawing/2014/main" id="{8FE45800-CD43-DD45-AE1E-0E2F338A9738}"/>
+                </a:ext>
+              </a:extLst>
+            </p:cNvPr>
+            <p:cNvSpPr/>
+            <p:nvPr/>
+          </p:nvSpPr>
+          <p:spPr>
+            <a:xfrm>
+              <a:off x="21050691" y="13009770"/>
+              <a:ext cx="762733" cy="193259"/>
+            </a:xfrm>
+            <a:prstGeom prst="rightArrow">
+              <a:avLst/>
+            </a:prstGeom>
+            <a:solidFill>
+              <a:schemeClr val="accent2">
+                <a:lumMod val="40000"/>
+                <a:lumOff val="60000"/>
+              </a:schemeClr>
+            </a:solidFill>
+          </p:spPr>
+          <p:style>
+            <a:lnRef idx="2">
+              <a:schemeClr val="accent1">
+                <a:shade val="50000"/>
+              </a:schemeClr>
+            </a:lnRef>
+            <a:fillRef idx="1">
+              <a:schemeClr val="accent1"/>
+            </a:fillRef>
+            <a:effectRef idx="0">
+              <a:schemeClr val="accent1"/>
+            </a:effectRef>
+            <a:fontRef idx="minor">
+              <a:schemeClr val="lt1"/>
+            </a:fontRef>
+          </p:style>
+          <p:txBody>
+            <a:bodyPr rtlCol="0" anchor="ctr"/>
+            <a:lstStyle/>
+            <a:p>
+              <a:pPr algn="ctr"/>
+              <a:endParaRPr lang="en-US">
                 <a:solidFill>
                   <a:schemeClr val="tx1"/>
                 </a:solidFill>
-                <a:latin typeface="Avenir Book" panose="02000503020000020003" pitchFamily="2" charset="0"/>
-                <a:ea typeface="+mj-ea"/>
-                <a:cs typeface="+mj-cs"/>
-              </a:defRPr>
-            </a:lvl1pPr>
-          </a:lstStyle>
-          <a:p>
-            <a:r>
-              <a:rPr lang="en-US" sz="2000">
-                <a:solidFill>
-                  <a:srgbClr val="434343"/>
-                </a:solidFill>
-              </a:rPr>
-              <a:t>Simulate!</a:t>
-            </a:r>
-            <a:endParaRPr lang="en-US" sz="2000">
-              <a:solidFill>
-                <a:srgbClr val="FF0000"/>
-              </a:solidFill>
-            </a:endParaRPr>
-          </a:p>
-        </p:txBody>
-      </p:sp>
-      <p:sp>
-        <p:nvSpPr>
-          <p:cNvPr id="15" name="Google Shape;66;p14">
-            <a:extLst>
-              <a:ext uri="{FF2B5EF4-FFF2-40B4-BE49-F238E27FC236}">
-                <a16:creationId xmlns:a16="http://schemas.microsoft.com/office/drawing/2014/main" id="{CDB68465-9325-294A-B018-DE059FE1010D}"/>
-              </a:ext>
-            </a:extLst>
-          </p:cNvPr>
-          <p:cNvSpPr txBox="1">
-            <a:spLocks/>
-          </p:cNvSpPr>
-          <p:nvPr/>
-        </p:nvSpPr>
-        <p:spPr>
-          <a:xfrm>
-            <a:off x="8253116" y="1769456"/>
-            <a:ext cx="3560762" cy="852488"/>
-          </a:xfrm>
-          <a:prstGeom prst="rect">
-            <a:avLst/>
-          </a:prstGeom>
-        </p:spPr>
-        <p:txBody>
-          <a:bodyPr spcFirstLastPara="1" vert="horz" wrap="square" lIns="121900" tIns="121900" rIns="121900" bIns="121900" rtlCol="0" anchor="t" anchorCtr="0">
-            <a:noAutofit/>
-          </a:bodyPr>
-          <a:lstStyle>
-            <a:lvl1pPr algn="l" defTabSz="914400" rtl="0" eaLnBrk="1" latinLnBrk="0" hangingPunct="1">
-              <a:lnSpc>
-                <a:spcPct val="90000"/>
-              </a:lnSpc>
-              <a:spcBef>
-                <a:spcPct val="0"/>
-              </a:spcBef>
-              <a:buNone/>
-              <a:defRPr sz="4400" kern="1200">
+              </a:endParaRPr>
+            </a:p>
+          </p:txBody>
+        </p:sp>
+        <p:sp>
+          <p:nvSpPr>
+            <p:cNvPr id="12" name="Bent Arrow 11">
+              <a:extLst>
+                <a:ext uri="{FF2B5EF4-FFF2-40B4-BE49-F238E27FC236}">
+                  <a16:creationId xmlns:a16="http://schemas.microsoft.com/office/drawing/2014/main" id="{78C187DF-239C-8441-AF91-8A19523FFF95}"/>
+                </a:ext>
+              </a:extLst>
+            </p:cNvPr>
+            <p:cNvSpPr/>
+            <p:nvPr/>
+          </p:nvSpPr>
+          <p:spPr>
+            <a:xfrm rot="10800000">
+              <a:off x="22638009" y="13653851"/>
+              <a:ext cx="394353" cy="1414246"/>
+            </a:xfrm>
+            <a:prstGeom prst="bentArrow">
+              <a:avLst/>
+            </a:prstGeom>
+            <a:solidFill>
+              <a:schemeClr val="accent2">
+                <a:lumMod val="40000"/>
+                <a:lumOff val="60000"/>
+              </a:schemeClr>
+            </a:solidFill>
+          </p:spPr>
+          <p:style>
+            <a:lnRef idx="2">
+              <a:schemeClr val="accent1">
+                <a:shade val="50000"/>
+              </a:schemeClr>
+            </a:lnRef>
+            <a:fillRef idx="1">
+              <a:schemeClr val="accent1"/>
+            </a:fillRef>
+            <a:effectRef idx="0">
+              <a:schemeClr val="accent1"/>
+            </a:effectRef>
+            <a:fontRef idx="minor">
+              <a:schemeClr val="lt1"/>
+            </a:fontRef>
+          </p:style>
+          <p:txBody>
+            <a:bodyPr rtlCol="0" anchor="ctr"/>
+            <a:lstStyle/>
+            <a:p>
+              <a:pPr algn="ctr"/>
+              <a:endParaRPr lang="en-US">
                 <a:solidFill>
                   <a:schemeClr val="tx1"/>
                 </a:solidFill>
-                <a:latin typeface="Avenir Book" panose="02000503020000020003" pitchFamily="2" charset="0"/>
-                <a:ea typeface="+mj-ea"/>
-                <a:cs typeface="+mj-cs"/>
-              </a:defRPr>
-            </a:lvl1pPr>
-          </a:lstStyle>
-          <a:p>
-            <a:r>
-              <a:rPr lang="en-US" sz="2000" dirty="0">
+              </a:endParaRPr>
+            </a:p>
+          </p:txBody>
+        </p:sp>
+        <p:sp>
+          <p:nvSpPr>
+            <p:cNvPr id="13" name="Rounded Rectangle 12">
+              <a:extLst>
+                <a:ext uri="{FF2B5EF4-FFF2-40B4-BE49-F238E27FC236}">
+                  <a16:creationId xmlns:a16="http://schemas.microsoft.com/office/drawing/2014/main" id="{84B58FB3-F0C4-9B47-A911-88546C4651BD}"/>
+                </a:ext>
+              </a:extLst>
+            </p:cNvPr>
+            <p:cNvSpPr/>
+            <p:nvPr/>
+          </p:nvSpPr>
+          <p:spPr>
+            <a:xfrm>
+              <a:off x="19931094" y="14510729"/>
+              <a:ext cx="2575560" cy="914400"/>
+            </a:xfrm>
+            <a:prstGeom prst="roundRect">
+              <a:avLst/>
+            </a:prstGeom>
+            <a:solidFill>
+              <a:schemeClr val="accent2">
+                <a:lumMod val="40000"/>
+                <a:lumOff val="60000"/>
+              </a:schemeClr>
+            </a:solidFill>
+          </p:spPr>
+          <p:style>
+            <a:lnRef idx="2">
+              <a:schemeClr val="accent1">
+                <a:shade val="50000"/>
+              </a:schemeClr>
+            </a:lnRef>
+            <a:fillRef idx="1">
+              <a:schemeClr val="accent1"/>
+            </a:fillRef>
+            <a:effectRef idx="0">
+              <a:schemeClr val="accent1"/>
+            </a:effectRef>
+            <a:fontRef idx="minor">
+              <a:schemeClr val="lt1"/>
+            </a:fontRef>
+          </p:style>
+          <p:txBody>
+            <a:bodyPr rtlCol="0" anchor="ctr"/>
+            <a:lstStyle/>
+            <a:p>
+              <a:pPr algn="ctr"/>
+              <a:r>
+                <a:rPr lang="en-US" sz="2800" dirty="0">
+                  <a:solidFill>
+                    <a:schemeClr val="tx1"/>
+                  </a:solidFill>
+                  <a:latin typeface="Avenir Book" panose="02000503020000020003" pitchFamily="2" charset="0"/>
+                </a:rPr>
+                <a:t>Bioscrape</a:t>
+              </a:r>
+            </a:p>
+          </p:txBody>
+        </p:sp>
+        <p:sp>
+          <p:nvSpPr>
+            <p:cNvPr id="14" name="Right Arrow 13">
+              <a:extLst>
+                <a:ext uri="{FF2B5EF4-FFF2-40B4-BE49-F238E27FC236}">
+                  <a16:creationId xmlns:a16="http://schemas.microsoft.com/office/drawing/2014/main" id="{5FF803F4-8885-864F-B07E-2411EA8CFC93}"/>
+                </a:ext>
+              </a:extLst>
+            </p:cNvPr>
+            <p:cNvSpPr/>
+            <p:nvPr/>
+          </p:nvSpPr>
+          <p:spPr>
+            <a:xfrm rot="10800000">
+              <a:off x="19037006" y="14884685"/>
+              <a:ext cx="762733" cy="193259"/>
+            </a:xfrm>
+            <a:prstGeom prst="rightArrow">
+              <a:avLst/>
+            </a:prstGeom>
+            <a:solidFill>
+              <a:schemeClr val="accent2">
+                <a:lumMod val="40000"/>
+                <a:lumOff val="60000"/>
+              </a:schemeClr>
+            </a:solidFill>
+          </p:spPr>
+          <p:style>
+            <a:lnRef idx="2">
+              <a:schemeClr val="accent1">
+                <a:shade val="50000"/>
+              </a:schemeClr>
+            </a:lnRef>
+            <a:fillRef idx="1">
+              <a:schemeClr val="accent1"/>
+            </a:fillRef>
+            <a:effectRef idx="0">
+              <a:schemeClr val="accent1"/>
+            </a:effectRef>
+            <a:fontRef idx="minor">
+              <a:schemeClr val="lt1"/>
+            </a:fontRef>
+          </p:style>
+          <p:txBody>
+            <a:bodyPr rtlCol="0" anchor="ctr"/>
+            <a:lstStyle/>
+            <a:p>
+              <a:pPr algn="ctr"/>
+              <a:endParaRPr lang="en-US">
                 <a:solidFill>
-                  <a:srgbClr val="434343"/>
+                  <a:schemeClr val="tx1"/>
                 </a:solidFill>
-              </a:rPr>
-              <a:t>Create Model!</a:t>
-            </a:r>
-            <a:endParaRPr lang="en-US" sz="2000" dirty="0">
-              <a:solidFill>
-                <a:srgbClr val="FF0000"/>
-              </a:solidFill>
-            </a:endParaRPr>
-          </a:p>
-        </p:txBody>
-      </p:sp>
+              </a:endParaRPr>
+            </a:p>
+          </p:txBody>
+        </p:sp>
+        <p:sp>
+          <p:nvSpPr>
+            <p:cNvPr id="15" name="Rounded Rectangle 14">
+              <a:extLst>
+                <a:ext uri="{FF2B5EF4-FFF2-40B4-BE49-F238E27FC236}">
+                  <a16:creationId xmlns:a16="http://schemas.microsoft.com/office/drawing/2014/main" id="{5A8DAC31-3E86-1540-8BC0-4B38DF78E761}"/>
+                </a:ext>
+              </a:extLst>
+            </p:cNvPr>
+            <p:cNvSpPr/>
+            <p:nvPr/>
+          </p:nvSpPr>
+          <p:spPr>
+            <a:xfrm>
+              <a:off x="16330090" y="14524115"/>
+              <a:ext cx="2575560" cy="914400"/>
+            </a:xfrm>
+            <a:prstGeom prst="roundRect">
+              <a:avLst/>
+            </a:prstGeom>
+            <a:solidFill>
+              <a:schemeClr val="accent2">
+                <a:lumMod val="40000"/>
+                <a:lumOff val="60000"/>
+              </a:schemeClr>
+            </a:solidFill>
+          </p:spPr>
+          <p:style>
+            <a:lnRef idx="2">
+              <a:schemeClr val="accent1">
+                <a:shade val="50000"/>
+              </a:schemeClr>
+            </a:lnRef>
+            <a:fillRef idx="1">
+              <a:schemeClr val="accent1"/>
+            </a:fillRef>
+            <a:effectRef idx="0">
+              <a:schemeClr val="accent1"/>
+            </a:effectRef>
+            <a:fontRef idx="minor">
+              <a:schemeClr val="lt1"/>
+            </a:fontRef>
+          </p:style>
+          <p:txBody>
+            <a:bodyPr rtlCol="0" anchor="ctr"/>
+            <a:lstStyle/>
+            <a:p>
+              <a:pPr algn="ctr"/>
+              <a:r>
+                <a:rPr lang="en-US" sz="2800" dirty="0">
+                  <a:solidFill>
+                    <a:schemeClr val="tx1"/>
+                  </a:solidFill>
+                  <a:latin typeface="Avenir Book" panose="02000503020000020003" pitchFamily="2" charset="0"/>
+                </a:rPr>
+                <a:t>Output!</a:t>
+              </a:r>
+            </a:p>
+          </p:txBody>
+        </p:sp>
+      </p:grpSp>
     </p:spTree>
     <p:extLst>
       <p:ext uri="{BB962C8B-B14F-4D97-AF65-F5344CB8AC3E}">
-        <p14:creationId xmlns:p14="http://schemas.microsoft.com/office/powerpoint/2010/main" val="3914364791"/>
+        <p14:creationId xmlns:p14="http://schemas.microsoft.com/office/powerpoint/2010/main" val="1841707622"/>
       </p:ext>
     </p:extLst>
   </p:cSld>
@@ -16806,157 +17344,6 @@
           </a:p>
         </p:txBody>
       </p:sp>
-      <p:grpSp>
-        <p:nvGrpSpPr>
-          <p:cNvPr id="6" name="Group 5">
-            <a:extLst>
-              <a:ext uri="{FF2B5EF4-FFF2-40B4-BE49-F238E27FC236}">
-                <a16:creationId xmlns:a16="http://schemas.microsoft.com/office/drawing/2014/main" id="{FF52BA0A-0BBD-4649-A9B4-37EFF8B09DF4}"/>
-              </a:ext>
-            </a:extLst>
-          </p:cNvPr>
-          <p:cNvGrpSpPr/>
-          <p:nvPr/>
-        </p:nvGrpSpPr>
-        <p:grpSpPr>
-          <a:xfrm>
-            <a:off x="4422757" y="1404613"/>
-            <a:ext cx="6577038" cy="4606669"/>
-            <a:chOff x="4498957" y="2611113"/>
-            <a:chExt cx="6577038" cy="4606669"/>
-          </a:xfrm>
-        </p:grpSpPr>
-        <p:pic>
-          <p:nvPicPr>
-            <p:cNvPr id="8" name="Picture 7" descr="A screenshot of a cell phone&#10;&#10;Description automatically generated">
-              <a:extLst>
-                <a:ext uri="{FF2B5EF4-FFF2-40B4-BE49-F238E27FC236}">
-                  <a16:creationId xmlns:a16="http://schemas.microsoft.com/office/drawing/2014/main" id="{DDF31D52-4963-674A-B960-E9F0ACCCD3BD}"/>
-                </a:ext>
-              </a:extLst>
-            </p:cNvPr>
-            <p:cNvPicPr>
-              <a:picLocks noChangeAspect="1"/>
-            </p:cNvPicPr>
-            <p:nvPr/>
-          </p:nvPicPr>
-          <p:blipFill>
-            <a:blip r:embed="rId3"/>
-            <a:stretch>
-              <a:fillRect/>
-            </a:stretch>
-          </p:blipFill>
-          <p:spPr>
-            <a:xfrm>
-              <a:off x="9121593" y="2674991"/>
-              <a:ext cx="1954402" cy="2028308"/>
-            </a:xfrm>
-            <a:prstGeom prst="rect">
-              <a:avLst/>
-            </a:prstGeom>
-          </p:spPr>
-        </p:pic>
-        <p:sp>
-          <p:nvSpPr>
-            <p:cNvPr id="9" name="TextBox 8">
-              <a:extLst>
-                <a:ext uri="{FF2B5EF4-FFF2-40B4-BE49-F238E27FC236}">
-                  <a16:creationId xmlns:a16="http://schemas.microsoft.com/office/drawing/2014/main" id="{7150DA75-AD77-C049-ABEE-42144CE73FFC}"/>
-                </a:ext>
-              </a:extLst>
-            </p:cNvPr>
-            <p:cNvSpPr txBox="1"/>
-            <p:nvPr/>
-          </p:nvSpPr>
-          <p:spPr>
-            <a:xfrm>
-              <a:off x="6480688" y="6418985"/>
-              <a:ext cx="1054231" cy="276999"/>
-            </a:xfrm>
-            <a:prstGeom prst="rect">
-              <a:avLst/>
-            </a:prstGeom>
-            <a:noFill/>
-          </p:spPr>
-          <p:txBody>
-            <a:bodyPr wrap="square" rtlCol="0">
-              <a:spAutoFit/>
-            </a:bodyPr>
-            <a:lstStyle/>
-            <a:p>
-              <a:r>
-                <a:rPr lang="en-US" sz="1200" dirty="0">
-                  <a:solidFill>
-                    <a:srgbClr val="E53BDE"/>
-                  </a:solidFill>
-                  <a:latin typeface="Avenir Book" panose="02000503020000020003" pitchFamily="2" charset="0"/>
-                </a:rPr>
-                <a:t>414.6</a:t>
-              </a:r>
-            </a:p>
-          </p:txBody>
-        </p:sp>
-        <p:pic>
-          <p:nvPicPr>
-            <p:cNvPr id="10" name="Picture 9" descr="A screenshot of a cell phone&#10;&#10;Description automatically generated">
-              <a:extLst>
-                <a:ext uri="{FF2B5EF4-FFF2-40B4-BE49-F238E27FC236}">
-                  <a16:creationId xmlns:a16="http://schemas.microsoft.com/office/drawing/2014/main" id="{36C8EB9A-3FD5-FE43-8ED1-47DAB9147E9A}"/>
-                </a:ext>
-              </a:extLst>
-            </p:cNvPr>
-            <p:cNvPicPr>
-              <a:picLocks noChangeAspect="1"/>
-            </p:cNvPicPr>
-            <p:nvPr/>
-          </p:nvPicPr>
-          <p:blipFill>
-            <a:blip r:embed="rId4"/>
-            <a:stretch>
-              <a:fillRect/>
-            </a:stretch>
-          </p:blipFill>
-          <p:spPr>
-            <a:xfrm>
-              <a:off x="4498957" y="2611113"/>
-              <a:ext cx="4114800" cy="2286000"/>
-            </a:xfrm>
-            <a:prstGeom prst="rect">
-              <a:avLst/>
-            </a:prstGeom>
-          </p:spPr>
-        </p:pic>
-        <p:pic>
-          <p:nvPicPr>
-            <p:cNvPr id="11" name="Picture 10" descr="A picture containing knife&#10;&#10;Description automatically generated">
-              <a:extLst>
-                <a:ext uri="{FF2B5EF4-FFF2-40B4-BE49-F238E27FC236}">
-                  <a16:creationId xmlns:a16="http://schemas.microsoft.com/office/drawing/2014/main" id="{A77D7A99-317B-D348-8492-662B8B9B735A}"/>
-                </a:ext>
-              </a:extLst>
-            </p:cNvPr>
-            <p:cNvPicPr>
-              <a:picLocks noChangeAspect="1"/>
-            </p:cNvPicPr>
-            <p:nvPr/>
-          </p:nvPicPr>
-          <p:blipFill>
-            <a:blip r:embed="rId5"/>
-            <a:stretch>
-              <a:fillRect/>
-            </a:stretch>
-          </p:blipFill>
-          <p:spPr>
-            <a:xfrm>
-              <a:off x="9554944" y="4923095"/>
-              <a:ext cx="1212113" cy="2294687"/>
-            </a:xfrm>
-            <a:prstGeom prst="rect">
-              <a:avLst/>
-            </a:prstGeom>
-          </p:spPr>
-        </p:pic>
-      </p:grpSp>
       <p:pic>
         <p:nvPicPr>
           <p:cNvPr id="12" name="Content Placeholder 4" descr="A close up of a map&#10;&#10;Description automatically generated">
@@ -16972,7 +17359,7 @@
           <p:nvPr/>
         </p:nvPicPr>
         <p:blipFill>
-          <a:blip r:embed="rId6"/>
+          <a:blip r:embed="rId3"/>
           <a:stretch>
             <a:fillRect/>
           </a:stretch>
@@ -16987,72 +17374,244 @@
           </a:prstGeom>
         </p:spPr>
       </p:pic>
-      <p:pic>
-        <p:nvPicPr>
-          <p:cNvPr id="13" name="Picture 12" descr="A close up of a piece of paper&#10;&#10;Description automatically generated">
+      <p:grpSp>
+        <p:nvGrpSpPr>
+          <p:cNvPr id="7" name="Group 6">
             <a:extLst>
               <a:ext uri="{FF2B5EF4-FFF2-40B4-BE49-F238E27FC236}">
-                <a16:creationId xmlns:a16="http://schemas.microsoft.com/office/drawing/2014/main" id="{67ABAB01-899C-034B-A3D6-58EE90E80B63}"/>
+                <a16:creationId xmlns:a16="http://schemas.microsoft.com/office/drawing/2014/main" id="{24727520-B6AD-5A49-B299-FDDE487B63E9}"/>
               </a:ext>
             </a:extLst>
           </p:cNvPr>
-          <p:cNvPicPr>
-            <a:picLocks noChangeAspect="1"/>
-          </p:cNvPicPr>
+          <p:cNvGrpSpPr/>
           <p:nvPr/>
-        </p:nvPicPr>
-        <p:blipFill>
-          <a:blip r:embed="rId7">
-            <a:extLst>
-              <a:ext uri="{28A0092B-C50C-407E-A947-70E740481C1C}">
-                <a14:useLocalDpi xmlns:a14="http://schemas.microsoft.com/office/drawing/2010/main" val="0"/>
-              </a:ext>
-            </a:extLst>
-          </a:blip>
-          <a:stretch>
-            <a:fillRect/>
-          </a:stretch>
-        </p:blipFill>
-        <p:spPr>
+        </p:nvGrpSpPr>
+        <p:grpSpPr>
           <a:xfrm>
-            <a:off x="4422757" y="3725282"/>
-            <a:ext cx="4114800" cy="2286000"/>
+            <a:off x="3975408" y="1387278"/>
+            <a:ext cx="6632502" cy="4606669"/>
+            <a:chOff x="4367293" y="1404613"/>
+            <a:chExt cx="6632502" cy="4606669"/>
           </a:xfrm>
-          <a:prstGeom prst="rect">
-            <a:avLst/>
-          </a:prstGeom>
-        </p:spPr>
-      </p:pic>
-      <p:pic>
-        <p:nvPicPr>
-          <p:cNvPr id="15" name="Picture 14">
-            <a:extLst>
-              <a:ext uri="{FF2B5EF4-FFF2-40B4-BE49-F238E27FC236}">
-                <a16:creationId xmlns:a16="http://schemas.microsoft.com/office/drawing/2014/main" id="{D64719D3-D7A0-154C-A90D-52DEAF819D90}"/>
-              </a:ext>
-            </a:extLst>
-          </p:cNvPr>
-          <p:cNvPicPr>
-            <a:picLocks noChangeAspect="1"/>
-          </p:cNvPicPr>
-          <p:nvPr/>
-        </p:nvPicPr>
-        <p:blipFill>
-          <a:blip r:embed="rId8"/>
-          <a:stretch>
-            <a:fillRect/>
-          </a:stretch>
-        </p:blipFill>
-        <p:spPr>
-          <a:xfrm>
-            <a:off x="4367293" y="1868271"/>
-            <a:ext cx="245865" cy="1264447"/>
-          </a:xfrm>
-          <a:prstGeom prst="rect">
-            <a:avLst/>
-          </a:prstGeom>
-        </p:spPr>
-      </p:pic>
+        </p:grpSpPr>
+        <p:grpSp>
+          <p:nvGrpSpPr>
+            <p:cNvPr id="6" name="Group 5">
+              <a:extLst>
+                <a:ext uri="{FF2B5EF4-FFF2-40B4-BE49-F238E27FC236}">
+                  <a16:creationId xmlns:a16="http://schemas.microsoft.com/office/drawing/2014/main" id="{FF52BA0A-0BBD-4649-A9B4-37EFF8B09DF4}"/>
+                </a:ext>
+              </a:extLst>
+            </p:cNvPr>
+            <p:cNvGrpSpPr/>
+            <p:nvPr/>
+          </p:nvGrpSpPr>
+          <p:grpSpPr>
+            <a:xfrm>
+              <a:off x="4422757" y="1404613"/>
+              <a:ext cx="6577038" cy="4606669"/>
+              <a:chOff x="4498957" y="2611113"/>
+              <a:chExt cx="6577038" cy="4606669"/>
+            </a:xfrm>
+          </p:grpSpPr>
+          <p:pic>
+            <p:nvPicPr>
+              <p:cNvPr id="8" name="Picture 7" descr="A screenshot of a cell phone&#10;&#10;Description automatically generated">
+                <a:extLst>
+                  <a:ext uri="{FF2B5EF4-FFF2-40B4-BE49-F238E27FC236}">
+                    <a16:creationId xmlns:a16="http://schemas.microsoft.com/office/drawing/2014/main" id="{DDF31D52-4963-674A-B960-E9F0ACCCD3BD}"/>
+                  </a:ext>
+                </a:extLst>
+              </p:cNvPr>
+              <p:cNvPicPr>
+                <a:picLocks noChangeAspect="1"/>
+              </p:cNvPicPr>
+              <p:nvPr/>
+            </p:nvPicPr>
+            <p:blipFill>
+              <a:blip r:embed="rId4"/>
+              <a:stretch>
+                <a:fillRect/>
+              </a:stretch>
+            </p:blipFill>
+            <p:spPr>
+              <a:xfrm>
+                <a:off x="9121593" y="2674991"/>
+                <a:ext cx="1954402" cy="2028308"/>
+              </a:xfrm>
+              <a:prstGeom prst="rect">
+                <a:avLst/>
+              </a:prstGeom>
+            </p:spPr>
+          </p:pic>
+          <p:sp>
+            <p:nvSpPr>
+              <p:cNvPr id="9" name="TextBox 8">
+                <a:extLst>
+                  <a:ext uri="{FF2B5EF4-FFF2-40B4-BE49-F238E27FC236}">
+                    <a16:creationId xmlns:a16="http://schemas.microsoft.com/office/drawing/2014/main" id="{7150DA75-AD77-C049-ABEE-42144CE73FFC}"/>
+                  </a:ext>
+                </a:extLst>
+              </p:cNvPr>
+              <p:cNvSpPr txBox="1"/>
+              <p:nvPr/>
+            </p:nvSpPr>
+            <p:spPr>
+              <a:xfrm>
+                <a:off x="6480688" y="6418985"/>
+                <a:ext cx="1054231" cy="276999"/>
+              </a:xfrm>
+              <a:prstGeom prst="rect">
+                <a:avLst/>
+              </a:prstGeom>
+              <a:noFill/>
+            </p:spPr>
+            <p:txBody>
+              <a:bodyPr wrap="square" rtlCol="0">
+                <a:spAutoFit/>
+              </a:bodyPr>
+              <a:lstStyle/>
+              <a:p>
+                <a:r>
+                  <a:rPr lang="en-US" sz="1200" dirty="0">
+                    <a:solidFill>
+                      <a:srgbClr val="E53BDE"/>
+                    </a:solidFill>
+                    <a:latin typeface="Avenir Book" panose="02000503020000020003" pitchFamily="2" charset="0"/>
+                  </a:rPr>
+                  <a:t>414.6</a:t>
+                </a:r>
+              </a:p>
+            </p:txBody>
+          </p:sp>
+          <p:pic>
+            <p:nvPicPr>
+              <p:cNvPr id="10" name="Picture 9" descr="A screenshot of a cell phone&#10;&#10;Description automatically generated">
+                <a:extLst>
+                  <a:ext uri="{FF2B5EF4-FFF2-40B4-BE49-F238E27FC236}">
+                    <a16:creationId xmlns:a16="http://schemas.microsoft.com/office/drawing/2014/main" id="{36C8EB9A-3FD5-FE43-8ED1-47DAB9147E9A}"/>
+                  </a:ext>
+                </a:extLst>
+              </p:cNvPr>
+              <p:cNvPicPr>
+                <a:picLocks noChangeAspect="1"/>
+              </p:cNvPicPr>
+              <p:nvPr/>
+            </p:nvPicPr>
+            <p:blipFill>
+              <a:blip r:embed="rId5"/>
+              <a:stretch>
+                <a:fillRect/>
+              </a:stretch>
+            </p:blipFill>
+            <p:spPr>
+              <a:xfrm>
+                <a:off x="4498957" y="2611113"/>
+                <a:ext cx="4114800" cy="2286000"/>
+              </a:xfrm>
+              <a:prstGeom prst="rect">
+                <a:avLst/>
+              </a:prstGeom>
+            </p:spPr>
+          </p:pic>
+          <p:pic>
+            <p:nvPicPr>
+              <p:cNvPr id="11" name="Picture 10" descr="A picture containing knife&#10;&#10;Description automatically generated">
+                <a:extLst>
+                  <a:ext uri="{FF2B5EF4-FFF2-40B4-BE49-F238E27FC236}">
+                    <a16:creationId xmlns:a16="http://schemas.microsoft.com/office/drawing/2014/main" id="{A77D7A99-317B-D348-8492-662B8B9B735A}"/>
+                  </a:ext>
+                </a:extLst>
+              </p:cNvPr>
+              <p:cNvPicPr>
+                <a:picLocks noChangeAspect="1"/>
+              </p:cNvPicPr>
+              <p:nvPr/>
+            </p:nvPicPr>
+            <p:blipFill>
+              <a:blip r:embed="rId6"/>
+              <a:stretch>
+                <a:fillRect/>
+              </a:stretch>
+            </p:blipFill>
+            <p:spPr>
+              <a:xfrm>
+                <a:off x="9554944" y="4923095"/>
+                <a:ext cx="1212113" cy="2294687"/>
+              </a:xfrm>
+              <a:prstGeom prst="rect">
+                <a:avLst/>
+              </a:prstGeom>
+            </p:spPr>
+          </p:pic>
+        </p:grpSp>
+        <p:pic>
+          <p:nvPicPr>
+            <p:cNvPr id="13" name="Picture 12" descr="A close up of a piece of paper&#10;&#10;Description automatically generated">
+              <a:extLst>
+                <a:ext uri="{FF2B5EF4-FFF2-40B4-BE49-F238E27FC236}">
+                  <a16:creationId xmlns:a16="http://schemas.microsoft.com/office/drawing/2014/main" id="{67ABAB01-899C-034B-A3D6-58EE90E80B63}"/>
+                </a:ext>
+              </a:extLst>
+            </p:cNvPr>
+            <p:cNvPicPr>
+              <a:picLocks noChangeAspect="1"/>
+            </p:cNvPicPr>
+            <p:nvPr/>
+          </p:nvPicPr>
+          <p:blipFill>
+            <a:blip r:embed="rId7">
+              <a:extLst>
+                <a:ext uri="{28A0092B-C50C-407E-A947-70E740481C1C}">
+                  <a14:useLocalDpi xmlns:a14="http://schemas.microsoft.com/office/drawing/2010/main" val="0"/>
+                </a:ext>
+              </a:extLst>
+            </a:blip>
+            <a:stretch>
+              <a:fillRect/>
+            </a:stretch>
+          </p:blipFill>
+          <p:spPr>
+            <a:xfrm>
+              <a:off x="4422757" y="3725282"/>
+              <a:ext cx="4114800" cy="2286000"/>
+            </a:xfrm>
+            <a:prstGeom prst="rect">
+              <a:avLst/>
+            </a:prstGeom>
+          </p:spPr>
+        </p:pic>
+        <p:pic>
+          <p:nvPicPr>
+            <p:cNvPr id="15" name="Picture 14">
+              <a:extLst>
+                <a:ext uri="{FF2B5EF4-FFF2-40B4-BE49-F238E27FC236}">
+                  <a16:creationId xmlns:a16="http://schemas.microsoft.com/office/drawing/2014/main" id="{D64719D3-D7A0-154C-A90D-52DEAF819D90}"/>
+                </a:ext>
+              </a:extLst>
+            </p:cNvPr>
+            <p:cNvPicPr>
+              <a:picLocks noChangeAspect="1"/>
+            </p:cNvPicPr>
+            <p:nvPr/>
+          </p:nvPicPr>
+          <p:blipFill>
+            <a:blip r:embed="rId8"/>
+            <a:stretch>
+              <a:fillRect/>
+            </a:stretch>
+          </p:blipFill>
+          <p:spPr>
+            <a:xfrm>
+              <a:off x="4367293" y="1868271"/>
+              <a:ext cx="245865" cy="1264447"/>
+            </a:xfrm>
+            <a:prstGeom prst="rect">
+              <a:avLst/>
+            </a:prstGeom>
+          </p:spPr>
+        </p:pic>
+      </p:grpSp>
     </p:spTree>
     <p:extLst>
       <p:ext uri="{BB962C8B-B14F-4D97-AF65-F5344CB8AC3E}">
@@ -18621,7 +19180,7 @@
             <p:nvPr/>
           </p:nvPicPr>
           <p:blipFill>
-            <a:blip r:embed="rId2"/>
+            <a:blip r:embed="rId3"/>
             <a:stretch>
               <a:fillRect/>
             </a:stretch>
@@ -18651,7 +19210,7 @@
             <p:nvPr/>
           </p:nvPicPr>
           <p:blipFill>
-            <a:blip r:embed="rId3"/>
+            <a:blip r:embed="rId4"/>
             <a:stretch>
               <a:fillRect/>
             </a:stretch>
@@ -18681,7 +19240,7 @@
             <p:nvPr/>
           </p:nvPicPr>
           <p:blipFill>
-            <a:blip r:embed="rId4"/>
+            <a:blip r:embed="rId5"/>
             <a:stretch>
               <a:fillRect/>
             </a:stretch>
@@ -18828,7 +19387,7 @@
         </p:nvSpPr>
         <p:spPr>
           <a:xfrm>
-            <a:off x="244712" y="416182"/>
+            <a:off x="244712" y="284045"/>
             <a:ext cx="10515600" cy="548864"/>
           </a:xfrm>
           <a:prstGeom prst="rect">
@@ -20563,7 +21122,7 @@
         </p:nvSpPr>
         <p:spPr>
           <a:xfrm>
-            <a:off x="189808" y="217473"/>
+            <a:off x="220905" y="-6658"/>
             <a:ext cx="10515600" cy="1325563"/>
           </a:xfrm>
         </p:spPr>

</xml_diff>